<commit_message>
Updates to Day 4 files
Final updates of July 22, 2021 to Day 4 files
</commit_message>
<xml_diff>
--- a/Week_1/Day_4/Transport for London API Miniproject.pptx
+++ b/Week_1/Day_4/Transport for London API Miniproject.pptx
@@ -4,11 +4,18 @@
   <p:sldMasterIdLst>
     <p:sldMasterId id="2147483660" r:id="rId1"/>
   </p:sldMasterIdLst>
+  <p:notesMasterIdLst>
+    <p:notesMasterId r:id="rId10"/>
+  </p:notesMasterIdLst>
   <p:sldIdLst>
     <p:sldId id="256" r:id="rId2"/>
     <p:sldId id="257" r:id="rId3"/>
-    <p:sldId id="258" r:id="rId4"/>
-    <p:sldId id="259" r:id="rId5"/>
+    <p:sldId id="260" r:id="rId4"/>
+    <p:sldId id="258" r:id="rId5"/>
+    <p:sldId id="259" r:id="rId6"/>
+    <p:sldId id="261" r:id="rId7"/>
+    <p:sldId id="262" r:id="rId8"/>
+    <p:sldId id="264" r:id="rId9"/>
   </p:sldIdLst>
   <p:sldSz cx="12192000" cy="6858000"/>
   <p:notesSz cx="6858000" cy="9144000"/>
@@ -107,7 +114,538 @@
       </a:defRPr>
     </a:lvl9pPr>
   </p:defaultTextStyle>
+  <p:extLst>
+    <p:ext uri="{EFAFB233-063F-42B5-8137-9DF3F51BA10A}">
+      <p15:sldGuideLst xmlns:p15="http://schemas.microsoft.com/office/powerpoint/2012/main"/>
+    </p:ext>
+  </p:extLst>
 </p:presentation>
+</file>
+
+<file path=ppt/notesMasters/notesMaster1.xml><?xml version="1.0" encoding="utf-8"?>
+<p:notesMaster xmlns:a="http://schemas.openxmlformats.org/drawingml/2006/main" xmlns:r="http://schemas.openxmlformats.org/officeDocument/2006/relationships" xmlns:p="http://schemas.openxmlformats.org/presentationml/2006/main">
+  <p:cSld>
+    <p:bg>
+      <p:bgRef idx="1001">
+        <a:schemeClr val="bg1"/>
+      </p:bgRef>
+    </p:bg>
+    <p:spTree>
+      <p:nvGrpSpPr>
+        <p:cNvPr id="1" name=""/>
+        <p:cNvGrpSpPr/>
+        <p:nvPr/>
+      </p:nvGrpSpPr>
+      <p:grpSpPr>
+        <a:xfrm>
+          <a:off x="0" y="0"/>
+          <a:ext cx="0" cy="0"/>
+          <a:chOff x="0" y="0"/>
+          <a:chExt cx="0" cy="0"/>
+        </a:xfrm>
+      </p:grpSpPr>
+      <p:sp>
+        <p:nvSpPr>
+          <p:cNvPr id="2" name="Header Placeholder 1"/>
+          <p:cNvSpPr>
+            <a:spLocks noGrp="1"/>
+          </p:cNvSpPr>
+          <p:nvPr>
+            <p:ph type="hdr" sz="quarter"/>
+          </p:nvPr>
+        </p:nvSpPr>
+        <p:spPr>
+          <a:xfrm>
+            <a:off x="0" y="0"/>
+            <a:ext cx="2971800" cy="458788"/>
+          </a:xfrm>
+          <a:prstGeom prst="rect">
+            <a:avLst/>
+          </a:prstGeom>
+        </p:spPr>
+        <p:txBody>
+          <a:bodyPr vert="horz" lIns="91440" tIns="45720" rIns="91440" bIns="45720" rtlCol="0"/>
+          <a:lstStyle>
+            <a:lvl1pPr algn="l">
+              <a:defRPr sz="1200"/>
+            </a:lvl1pPr>
+          </a:lstStyle>
+          <a:p>
+            <a:endParaRPr lang="en-CA"/>
+          </a:p>
+        </p:txBody>
+      </p:sp>
+      <p:sp>
+        <p:nvSpPr>
+          <p:cNvPr id="3" name="Date Placeholder 2"/>
+          <p:cNvSpPr>
+            <a:spLocks noGrp="1"/>
+          </p:cNvSpPr>
+          <p:nvPr>
+            <p:ph type="dt" idx="1"/>
+          </p:nvPr>
+        </p:nvSpPr>
+        <p:spPr>
+          <a:xfrm>
+            <a:off x="3884613" y="0"/>
+            <a:ext cx="2971800" cy="458788"/>
+          </a:xfrm>
+          <a:prstGeom prst="rect">
+            <a:avLst/>
+          </a:prstGeom>
+        </p:spPr>
+        <p:txBody>
+          <a:bodyPr vert="horz" lIns="91440" tIns="45720" rIns="91440" bIns="45720" rtlCol="0"/>
+          <a:lstStyle>
+            <a:lvl1pPr algn="r">
+              <a:defRPr sz="1200"/>
+            </a:lvl1pPr>
+          </a:lstStyle>
+          <a:p>
+            <a:fld id="{81A8A069-BA3D-46A6-8556-56944FDB635F}" type="datetimeFigureOut">
+              <a:rPr lang="en-CA" smtClean="0"/>
+              <a:t>7/22/2021</a:t>
+            </a:fld>
+            <a:endParaRPr lang="en-CA"/>
+          </a:p>
+        </p:txBody>
+      </p:sp>
+      <p:sp>
+        <p:nvSpPr>
+          <p:cNvPr id="4" name="Slide Image Placeholder 3"/>
+          <p:cNvSpPr>
+            <a:spLocks noGrp="1" noRot="1" noChangeAspect="1"/>
+          </p:cNvSpPr>
+          <p:nvPr>
+            <p:ph type="sldImg" idx="2"/>
+          </p:nvPr>
+        </p:nvSpPr>
+        <p:spPr>
+          <a:xfrm>
+            <a:off x="685800" y="1143000"/>
+            <a:ext cx="5486400" cy="3086100"/>
+          </a:xfrm>
+          <a:prstGeom prst="rect">
+            <a:avLst/>
+          </a:prstGeom>
+          <a:noFill/>
+          <a:ln w="12700">
+            <a:solidFill>
+              <a:prstClr val="black"/>
+            </a:solidFill>
+          </a:ln>
+        </p:spPr>
+        <p:txBody>
+          <a:bodyPr vert="horz" lIns="91440" tIns="45720" rIns="91440" bIns="45720" rtlCol="0" anchor="ctr"/>
+          <a:lstStyle/>
+          <a:p>
+            <a:endParaRPr lang="en-CA"/>
+          </a:p>
+        </p:txBody>
+      </p:sp>
+      <p:sp>
+        <p:nvSpPr>
+          <p:cNvPr id="5" name="Notes Placeholder 4"/>
+          <p:cNvSpPr>
+            <a:spLocks noGrp="1"/>
+          </p:cNvSpPr>
+          <p:nvPr>
+            <p:ph type="body" sz="quarter" idx="3"/>
+          </p:nvPr>
+        </p:nvSpPr>
+        <p:spPr>
+          <a:xfrm>
+            <a:off x="685800" y="4400550"/>
+            <a:ext cx="5486400" cy="3600450"/>
+          </a:xfrm>
+          <a:prstGeom prst="rect">
+            <a:avLst/>
+          </a:prstGeom>
+        </p:spPr>
+        <p:txBody>
+          <a:bodyPr vert="horz" lIns="91440" tIns="45720" rIns="91440" bIns="45720" rtlCol="0"/>
+          <a:lstStyle/>
+          <a:p>
+            <a:pPr lvl="0"/>
+            <a:r>
+              <a:rPr lang="en-US"/>
+              <a:t>Edit Master text styles</a:t>
+            </a:r>
+          </a:p>
+          <a:p>
+            <a:pPr lvl="1"/>
+            <a:r>
+              <a:rPr lang="en-US"/>
+              <a:t>Second level</a:t>
+            </a:r>
+          </a:p>
+          <a:p>
+            <a:pPr lvl="2"/>
+            <a:r>
+              <a:rPr lang="en-US"/>
+              <a:t>Third level</a:t>
+            </a:r>
+          </a:p>
+          <a:p>
+            <a:pPr lvl="3"/>
+            <a:r>
+              <a:rPr lang="en-US"/>
+              <a:t>Fourth level</a:t>
+            </a:r>
+          </a:p>
+          <a:p>
+            <a:pPr lvl="4"/>
+            <a:r>
+              <a:rPr lang="en-US"/>
+              <a:t>Fifth level</a:t>
+            </a:r>
+            <a:endParaRPr lang="en-CA"/>
+          </a:p>
+        </p:txBody>
+      </p:sp>
+      <p:sp>
+        <p:nvSpPr>
+          <p:cNvPr id="6" name="Footer Placeholder 5"/>
+          <p:cNvSpPr>
+            <a:spLocks noGrp="1"/>
+          </p:cNvSpPr>
+          <p:nvPr>
+            <p:ph type="ftr" sz="quarter" idx="4"/>
+          </p:nvPr>
+        </p:nvSpPr>
+        <p:spPr>
+          <a:xfrm>
+            <a:off x="0" y="8685213"/>
+            <a:ext cx="2971800" cy="458787"/>
+          </a:xfrm>
+          <a:prstGeom prst="rect">
+            <a:avLst/>
+          </a:prstGeom>
+        </p:spPr>
+        <p:txBody>
+          <a:bodyPr vert="horz" lIns="91440" tIns="45720" rIns="91440" bIns="45720" rtlCol="0" anchor="b"/>
+          <a:lstStyle>
+            <a:lvl1pPr algn="l">
+              <a:defRPr sz="1200"/>
+            </a:lvl1pPr>
+          </a:lstStyle>
+          <a:p>
+            <a:endParaRPr lang="en-CA"/>
+          </a:p>
+        </p:txBody>
+      </p:sp>
+      <p:sp>
+        <p:nvSpPr>
+          <p:cNvPr id="7" name="Slide Number Placeholder 6"/>
+          <p:cNvSpPr>
+            <a:spLocks noGrp="1"/>
+          </p:cNvSpPr>
+          <p:nvPr>
+            <p:ph type="sldNum" sz="quarter" idx="5"/>
+          </p:nvPr>
+        </p:nvSpPr>
+        <p:spPr>
+          <a:xfrm>
+            <a:off x="3884613" y="8685213"/>
+            <a:ext cx="2971800" cy="458787"/>
+          </a:xfrm>
+          <a:prstGeom prst="rect">
+            <a:avLst/>
+          </a:prstGeom>
+        </p:spPr>
+        <p:txBody>
+          <a:bodyPr vert="horz" lIns="91440" tIns="45720" rIns="91440" bIns="45720" rtlCol="0" anchor="b"/>
+          <a:lstStyle>
+            <a:lvl1pPr algn="r">
+              <a:defRPr sz="1200"/>
+            </a:lvl1pPr>
+          </a:lstStyle>
+          <a:p>
+            <a:fld id="{188F1977-5685-4D41-84BF-DDDC42B2FD8A}" type="slidenum">
+              <a:rPr lang="en-CA" smtClean="0"/>
+              <a:t>‹#›</a:t>
+            </a:fld>
+            <a:endParaRPr lang="en-CA"/>
+          </a:p>
+        </p:txBody>
+      </p:sp>
+    </p:spTree>
+    <p:extLst>
+      <p:ext uri="{BB962C8B-B14F-4D97-AF65-F5344CB8AC3E}">
+        <p14:creationId xmlns:p14="http://schemas.microsoft.com/office/powerpoint/2010/main" val="3427800662"/>
+      </p:ext>
+    </p:extLst>
+  </p:cSld>
+  <p:clrMap bg1="lt1" tx1="dk1" bg2="lt2" tx2="dk2" accent1="accent1" accent2="accent2" accent3="accent3" accent4="accent4" accent5="accent5" accent6="accent6" hlink="hlink" folHlink="folHlink"/>
+  <p:notesStyle>
+    <a:lvl1pPr marL="0" algn="l" defTabSz="914400" rtl="0" eaLnBrk="1" latinLnBrk="0" hangingPunct="1">
+      <a:defRPr sz="1200" kern="1200">
+        <a:solidFill>
+          <a:schemeClr val="tx1"/>
+        </a:solidFill>
+        <a:latin typeface="+mn-lt"/>
+        <a:ea typeface="+mn-ea"/>
+        <a:cs typeface="+mn-cs"/>
+      </a:defRPr>
+    </a:lvl1pPr>
+    <a:lvl2pPr marL="457200" algn="l" defTabSz="914400" rtl="0" eaLnBrk="1" latinLnBrk="0" hangingPunct="1">
+      <a:defRPr sz="1200" kern="1200">
+        <a:solidFill>
+          <a:schemeClr val="tx1"/>
+        </a:solidFill>
+        <a:latin typeface="+mn-lt"/>
+        <a:ea typeface="+mn-ea"/>
+        <a:cs typeface="+mn-cs"/>
+      </a:defRPr>
+    </a:lvl2pPr>
+    <a:lvl3pPr marL="914400" algn="l" defTabSz="914400" rtl="0" eaLnBrk="1" latinLnBrk="0" hangingPunct="1">
+      <a:defRPr sz="1200" kern="1200">
+        <a:solidFill>
+          <a:schemeClr val="tx1"/>
+        </a:solidFill>
+        <a:latin typeface="+mn-lt"/>
+        <a:ea typeface="+mn-ea"/>
+        <a:cs typeface="+mn-cs"/>
+      </a:defRPr>
+    </a:lvl3pPr>
+    <a:lvl4pPr marL="1371600" algn="l" defTabSz="914400" rtl="0" eaLnBrk="1" latinLnBrk="0" hangingPunct="1">
+      <a:defRPr sz="1200" kern="1200">
+        <a:solidFill>
+          <a:schemeClr val="tx1"/>
+        </a:solidFill>
+        <a:latin typeface="+mn-lt"/>
+        <a:ea typeface="+mn-ea"/>
+        <a:cs typeface="+mn-cs"/>
+      </a:defRPr>
+    </a:lvl4pPr>
+    <a:lvl5pPr marL="1828800" algn="l" defTabSz="914400" rtl="0" eaLnBrk="1" latinLnBrk="0" hangingPunct="1">
+      <a:defRPr sz="1200" kern="1200">
+        <a:solidFill>
+          <a:schemeClr val="tx1"/>
+        </a:solidFill>
+        <a:latin typeface="+mn-lt"/>
+        <a:ea typeface="+mn-ea"/>
+        <a:cs typeface="+mn-cs"/>
+      </a:defRPr>
+    </a:lvl5pPr>
+    <a:lvl6pPr marL="2286000" algn="l" defTabSz="914400" rtl="0" eaLnBrk="1" latinLnBrk="0" hangingPunct="1">
+      <a:defRPr sz="1200" kern="1200">
+        <a:solidFill>
+          <a:schemeClr val="tx1"/>
+        </a:solidFill>
+        <a:latin typeface="+mn-lt"/>
+        <a:ea typeface="+mn-ea"/>
+        <a:cs typeface="+mn-cs"/>
+      </a:defRPr>
+    </a:lvl6pPr>
+    <a:lvl7pPr marL="2743200" algn="l" defTabSz="914400" rtl="0" eaLnBrk="1" latinLnBrk="0" hangingPunct="1">
+      <a:defRPr sz="1200" kern="1200">
+        <a:solidFill>
+          <a:schemeClr val="tx1"/>
+        </a:solidFill>
+        <a:latin typeface="+mn-lt"/>
+        <a:ea typeface="+mn-ea"/>
+        <a:cs typeface="+mn-cs"/>
+      </a:defRPr>
+    </a:lvl7pPr>
+    <a:lvl8pPr marL="3200400" algn="l" defTabSz="914400" rtl="0" eaLnBrk="1" latinLnBrk="0" hangingPunct="1">
+      <a:defRPr sz="1200" kern="1200">
+        <a:solidFill>
+          <a:schemeClr val="tx1"/>
+        </a:solidFill>
+        <a:latin typeface="+mn-lt"/>
+        <a:ea typeface="+mn-ea"/>
+        <a:cs typeface="+mn-cs"/>
+      </a:defRPr>
+    </a:lvl8pPr>
+    <a:lvl9pPr marL="3657600" algn="l" defTabSz="914400" rtl="0" eaLnBrk="1" latinLnBrk="0" hangingPunct="1">
+      <a:defRPr sz="1200" kern="1200">
+        <a:solidFill>
+          <a:schemeClr val="tx1"/>
+        </a:solidFill>
+        <a:latin typeface="+mn-lt"/>
+        <a:ea typeface="+mn-ea"/>
+        <a:cs typeface="+mn-cs"/>
+      </a:defRPr>
+    </a:lvl9pPr>
+  </p:notesStyle>
+</p:notesMaster>
+</file>
+
+<file path=ppt/notesSlides/notesSlide1.xml><?xml version="1.0" encoding="utf-8"?>
+<p:notes xmlns:a="http://schemas.openxmlformats.org/drawingml/2006/main" xmlns:r="http://schemas.openxmlformats.org/officeDocument/2006/relationships" xmlns:p="http://schemas.openxmlformats.org/presentationml/2006/main">
+  <p:cSld>
+    <p:spTree>
+      <p:nvGrpSpPr>
+        <p:cNvPr id="1" name=""/>
+        <p:cNvGrpSpPr/>
+        <p:nvPr/>
+      </p:nvGrpSpPr>
+      <p:grpSpPr>
+        <a:xfrm>
+          <a:off x="0" y="0"/>
+          <a:ext cx="0" cy="0"/>
+          <a:chOff x="0" y="0"/>
+          <a:chExt cx="0" cy="0"/>
+        </a:xfrm>
+      </p:grpSpPr>
+      <p:sp>
+        <p:nvSpPr>
+          <p:cNvPr id="2" name="Slide Image Placeholder 1"/>
+          <p:cNvSpPr>
+            <a:spLocks noGrp="1" noRot="1" noChangeAspect="1"/>
+          </p:cNvSpPr>
+          <p:nvPr>
+            <p:ph type="sldImg"/>
+          </p:nvPr>
+        </p:nvSpPr>
+        <p:spPr/>
+      </p:sp>
+      <p:sp>
+        <p:nvSpPr>
+          <p:cNvPr id="3" name="Notes Placeholder 2"/>
+          <p:cNvSpPr>
+            <a:spLocks noGrp="1"/>
+          </p:cNvSpPr>
+          <p:nvPr>
+            <p:ph type="body" idx="1"/>
+          </p:nvPr>
+        </p:nvSpPr>
+        <p:spPr/>
+        <p:txBody>
+          <a:bodyPr/>
+          <a:lstStyle/>
+          <a:p>
+            <a:r>
+              <a:rPr lang="en-CA" dirty="0"/>
+              <a:t>Include introduction</a:t>
+            </a:r>
+            <a:r>
+              <a:rPr lang="en-CA" baseline="0" dirty="0"/>
+              <a:t> to yourself on this slide</a:t>
+            </a:r>
+            <a:endParaRPr lang="en-CA" dirty="0"/>
+          </a:p>
+        </p:txBody>
+      </p:sp>
+      <p:sp>
+        <p:nvSpPr>
+          <p:cNvPr id="4" name="Slide Number Placeholder 3"/>
+          <p:cNvSpPr>
+            <a:spLocks noGrp="1"/>
+          </p:cNvSpPr>
+          <p:nvPr>
+            <p:ph type="sldNum" sz="quarter" idx="10"/>
+          </p:nvPr>
+        </p:nvSpPr>
+        <p:spPr/>
+        <p:txBody>
+          <a:bodyPr/>
+          <a:lstStyle/>
+          <a:p>
+            <a:fld id="{188F1977-5685-4D41-84BF-DDDC42B2FD8A}" type="slidenum">
+              <a:rPr lang="en-CA" smtClean="0"/>
+              <a:t>1</a:t>
+            </a:fld>
+            <a:endParaRPr lang="en-CA"/>
+          </a:p>
+        </p:txBody>
+      </p:sp>
+    </p:spTree>
+    <p:extLst>
+      <p:ext uri="{BB962C8B-B14F-4D97-AF65-F5344CB8AC3E}">
+        <p14:creationId xmlns:p14="http://schemas.microsoft.com/office/powerpoint/2010/main" val="1695172122"/>
+      </p:ext>
+    </p:extLst>
+  </p:cSld>
+  <p:clrMapOvr>
+    <a:masterClrMapping/>
+  </p:clrMapOvr>
+</p:notes>
+</file>
+
+<file path=ppt/notesSlides/notesSlide2.xml><?xml version="1.0" encoding="utf-8"?>
+<p:notes xmlns:a="http://schemas.openxmlformats.org/drawingml/2006/main" xmlns:r="http://schemas.openxmlformats.org/officeDocument/2006/relationships" xmlns:p="http://schemas.openxmlformats.org/presentationml/2006/main">
+  <p:cSld>
+    <p:spTree>
+      <p:nvGrpSpPr>
+        <p:cNvPr id="1" name=""/>
+        <p:cNvGrpSpPr/>
+        <p:nvPr/>
+      </p:nvGrpSpPr>
+      <p:grpSpPr>
+        <a:xfrm>
+          <a:off x="0" y="0"/>
+          <a:ext cx="0" cy="0"/>
+          <a:chOff x="0" y="0"/>
+          <a:chExt cx="0" cy="0"/>
+        </a:xfrm>
+      </p:grpSpPr>
+      <p:sp>
+        <p:nvSpPr>
+          <p:cNvPr id="2" name="Slide Image Placeholder 1"/>
+          <p:cNvSpPr>
+            <a:spLocks noGrp="1" noRot="1" noChangeAspect="1"/>
+          </p:cNvSpPr>
+          <p:nvPr>
+            <p:ph type="sldImg"/>
+          </p:nvPr>
+        </p:nvSpPr>
+        <p:spPr/>
+      </p:sp>
+      <p:sp>
+        <p:nvSpPr>
+          <p:cNvPr id="3" name="Notes Placeholder 2"/>
+          <p:cNvSpPr>
+            <a:spLocks noGrp="1"/>
+          </p:cNvSpPr>
+          <p:nvPr>
+            <p:ph type="body" idx="1"/>
+          </p:nvPr>
+        </p:nvSpPr>
+        <p:spPr/>
+        <p:txBody>
+          <a:bodyPr/>
+          <a:lstStyle/>
+          <a:p>
+            <a:endParaRPr lang="en-CA" dirty="0"/>
+          </a:p>
+        </p:txBody>
+      </p:sp>
+      <p:sp>
+        <p:nvSpPr>
+          <p:cNvPr id="4" name="Slide Number Placeholder 3"/>
+          <p:cNvSpPr>
+            <a:spLocks noGrp="1"/>
+          </p:cNvSpPr>
+          <p:nvPr>
+            <p:ph type="sldNum" sz="quarter" idx="10"/>
+          </p:nvPr>
+        </p:nvSpPr>
+        <p:spPr/>
+        <p:txBody>
+          <a:bodyPr/>
+          <a:lstStyle/>
+          <a:p>
+            <a:fld id="{188F1977-5685-4D41-84BF-DDDC42B2FD8A}" type="slidenum">
+              <a:rPr lang="en-CA" smtClean="0"/>
+              <a:t>6</a:t>
+            </a:fld>
+            <a:endParaRPr lang="en-CA"/>
+          </a:p>
+        </p:txBody>
+      </p:sp>
+    </p:spTree>
+    <p:extLst>
+      <p:ext uri="{BB962C8B-B14F-4D97-AF65-F5344CB8AC3E}">
+        <p14:creationId xmlns:p14="http://schemas.microsoft.com/office/powerpoint/2010/main" val="3435551363"/>
+      </p:ext>
+    </p:extLst>
+  </p:cSld>
+  <p:clrMapOvr>
+    <a:masterClrMapping/>
+  </p:clrMapOvr>
+</p:notes>
 </file>
 
 <file path=ppt/slideLayouts/slideLayout1.xml><?xml version="1.0" encoding="utf-8"?>
@@ -6151,14 +6689,13 @@
           <a:lstStyle/>
           <a:p>
             <a:r>
-              <a:rPr lang="en-CA" dirty="0"/>
-              <a:t>Transport for London API </a:t>
-            </a:r>
-            <a:r>
               <a:rPr lang="en-CA" dirty="0" err="1"/>
               <a:t>Miniproject</a:t>
             </a:r>
-            <a:endParaRPr lang="en-CA" dirty="0"/>
+            <a:r>
+              <a:rPr lang="en-CA" dirty="0"/>
+              <a:t> I</a:t>
+            </a:r>
           </a:p>
         </p:txBody>
       </p:sp>
@@ -6190,42 +6727,11 @@
           <a:p>
             <a:r>
               <a:rPr lang="en-CA" dirty="0"/>
-              <a:t>July 22, 2021</a:t>
-            </a:r>
-          </a:p>
-        </p:txBody>
-      </p:sp>
-      <p:pic>
-        <p:nvPicPr>
-          <p:cNvPr id="4" name="Picture 3"/>
-          <p:cNvPicPr>
-            <a:picLocks noChangeAspect="1"/>
-          </p:cNvPicPr>
-          <p:nvPr/>
-        </p:nvPicPr>
-        <p:blipFill>
-          <a:blip r:embed="rId2">
-            <a:extLst>
-              <a:ext uri="{28A0092B-C50C-407E-A947-70E740481C1C}">
-                <a14:useLocalDpi xmlns:a14="http://schemas.microsoft.com/office/drawing/2010/main" val="0"/>
-              </a:ext>
-            </a:extLst>
-          </a:blip>
-          <a:stretch>
-            <a:fillRect/>
-          </a:stretch>
-        </p:blipFill>
-        <p:spPr>
-          <a:xfrm>
-            <a:off x="10149847" y="119007"/>
-            <a:ext cx="1922403" cy="744593"/>
-          </a:xfrm>
-          <a:prstGeom prst="rect">
-            <a:avLst/>
-          </a:prstGeom>
-          <a:noFill/>
-        </p:spPr>
-      </p:pic>
+              <a:t>July 23, 2021</a:t>
+            </a:r>
+          </a:p>
+        </p:txBody>
+      </p:sp>
     </p:spTree>
     <p:extLst>
       <p:ext uri="{BB962C8B-B14F-4D97-AF65-F5344CB8AC3E}">
@@ -6313,19 +6819,23 @@
             </a:pPr>
             <a:r>
               <a:rPr lang="en-CA" sz="3600" dirty="0"/>
-              <a:t>Tools used</a:t>
-            </a:r>
-          </a:p>
-          <a:p>
-            <a:pPr marL="0" indent="0">
-              <a:buNone/>
+              <a:t>Objectives</a:t>
+            </a:r>
+          </a:p>
+          <a:p>
+            <a:pPr marL="457200" indent="-457200">
+              <a:buFont typeface="+mj-lt"/>
+              <a:buAutoNum type="arabicPeriod"/>
             </a:pPr>
-            <a:endParaRPr lang="en-CA" sz="3600" dirty="0"/>
-          </a:p>
-          <a:p>
-            <a:pPr marL="514350" indent="-514350">
+            <a:r>
+              <a:rPr lang="en-CA" sz="3600" dirty="0"/>
+              <a:t>Tools Used</a:t>
+            </a:r>
+          </a:p>
+          <a:p>
+            <a:pPr marL="457200" indent="-457200">
               <a:buFont typeface="+mj-lt"/>
-              <a:buAutoNum type="arabicPeriod" startAt="2"/>
+              <a:buAutoNum type="arabicPeriod"/>
             </a:pPr>
             <a:r>
               <a:rPr lang="en-CA" sz="3600" dirty="0"/>
@@ -6333,19 +6843,736 @@
             </a:r>
           </a:p>
           <a:p>
-            <a:pPr marL="0" indent="0">
-              <a:buNone/>
-            </a:pPr>
-            <a:endParaRPr lang="en-CA" sz="3600" dirty="0"/>
-          </a:p>
-          <a:p>
-            <a:pPr marL="514350" indent="-514350">
+            <a:pPr marL="457200" indent="-457200">
               <a:buFont typeface="+mj-lt"/>
-              <a:buAutoNum type="arabicPeriod" startAt="3"/>
+              <a:buAutoNum type="arabicPeriod"/>
             </a:pPr>
             <a:r>
               <a:rPr lang="en-CA" sz="3600" dirty="0"/>
               <a:t>Challenges</a:t>
+            </a:r>
+          </a:p>
+        </p:txBody>
+      </p:sp>
+    </p:spTree>
+    <p:extLst>
+      <p:ext uri="{BB962C8B-B14F-4D97-AF65-F5344CB8AC3E}">
+        <p14:creationId xmlns:p14="http://schemas.microsoft.com/office/powerpoint/2010/main" val="14362895"/>
+      </p:ext>
+    </p:extLst>
+  </p:cSld>
+  <p:clrMapOvr>
+    <a:masterClrMapping/>
+  </p:clrMapOvr>
+</p:sld>
+</file>
+
+<file path=ppt/slides/slide3.xml><?xml version="1.0" encoding="utf-8"?>
+<p:sld xmlns:a="http://schemas.openxmlformats.org/drawingml/2006/main" xmlns:r="http://schemas.openxmlformats.org/officeDocument/2006/relationships" xmlns:p="http://schemas.openxmlformats.org/presentationml/2006/main">
+  <p:cSld>
+    <p:spTree>
+      <p:nvGrpSpPr>
+        <p:cNvPr id="1" name=""/>
+        <p:cNvGrpSpPr/>
+        <p:nvPr/>
+      </p:nvGrpSpPr>
+      <p:grpSpPr>
+        <a:xfrm>
+          <a:off x="0" y="0"/>
+          <a:ext cx="0" cy="0"/>
+          <a:chOff x="0" y="0"/>
+          <a:chExt cx="0" cy="0"/>
+        </a:xfrm>
+      </p:grpSpPr>
+      <p:sp>
+        <p:nvSpPr>
+          <p:cNvPr id="2" name="Title 1"/>
+          <p:cNvSpPr>
+            <a:spLocks noGrp="1"/>
+          </p:cNvSpPr>
+          <p:nvPr>
+            <p:ph type="title"/>
+          </p:nvPr>
+        </p:nvSpPr>
+        <p:spPr>
+          <a:xfrm>
+            <a:off x="1484311" y="0"/>
+            <a:ext cx="10018713" cy="1752599"/>
+          </a:xfrm>
+        </p:spPr>
+        <p:txBody>
+          <a:bodyPr>
+            <a:normAutofit/>
+          </a:bodyPr>
+          <a:lstStyle/>
+          <a:p>
+            <a:r>
+              <a:rPr lang="en-CA" sz="5400" dirty="0"/>
+              <a:t>Objectives</a:t>
+            </a:r>
+          </a:p>
+        </p:txBody>
+      </p:sp>
+      <p:pic>
+        <p:nvPicPr>
+          <p:cNvPr id="9" name="Content Placeholder 8"/>
+          <p:cNvPicPr>
+            <a:picLocks noGrp="1" noChangeAspect="1"/>
+          </p:cNvPicPr>
+          <p:nvPr>
+            <p:ph idx="1"/>
+          </p:nvPr>
+        </p:nvPicPr>
+        <p:blipFill>
+          <a:blip r:embed="rId2">
+            <a:extLst>
+              <a:ext uri="{28A0092B-C50C-407E-A947-70E740481C1C}">
+                <a14:useLocalDpi xmlns:a14="http://schemas.microsoft.com/office/drawing/2010/main" val="0"/>
+              </a:ext>
+            </a:extLst>
+          </a:blip>
+          <a:stretch>
+            <a:fillRect/>
+          </a:stretch>
+        </p:blipFill>
+        <p:spPr>
+          <a:xfrm>
+            <a:off x="1089891" y="3375830"/>
+            <a:ext cx="10816297" cy="1965235"/>
+          </a:xfrm>
+        </p:spPr>
+      </p:pic>
+      <p:sp>
+        <p:nvSpPr>
+          <p:cNvPr id="10" name="TextBox 9"/>
+          <p:cNvSpPr txBox="1"/>
+          <p:nvPr/>
+        </p:nvSpPr>
+        <p:spPr>
+          <a:xfrm>
+            <a:off x="4845937" y="2302604"/>
+            <a:ext cx="3295460" cy="523220"/>
+          </a:xfrm>
+          <a:prstGeom prst="rect">
+            <a:avLst/>
+          </a:prstGeom>
+          <a:noFill/>
+        </p:spPr>
+        <p:txBody>
+          <a:bodyPr wrap="square" rtlCol="0">
+            <a:spAutoFit/>
+          </a:bodyPr>
+          <a:lstStyle/>
+          <a:p>
+            <a:r>
+              <a:rPr lang="en-CA" sz="2800" i="1" dirty="0"/>
+              <a:t>Test API functionality</a:t>
+            </a:r>
+          </a:p>
+        </p:txBody>
+      </p:sp>
+    </p:spTree>
+    <p:extLst>
+      <p:ext uri="{BB962C8B-B14F-4D97-AF65-F5344CB8AC3E}">
+        <p14:creationId xmlns:p14="http://schemas.microsoft.com/office/powerpoint/2010/main" val="4237030665"/>
+      </p:ext>
+    </p:extLst>
+  </p:cSld>
+  <p:clrMapOvr>
+    <a:masterClrMapping/>
+  </p:clrMapOvr>
+  <p:timing>
+    <p:tnLst>
+      <p:par>
+        <p:cTn id="1" dur="indefinite" restart="never" nodeType="tmRoot">
+          <p:childTnLst>
+            <p:seq concurrent="1" nextAc="seek">
+              <p:cTn id="2" dur="indefinite" nodeType="mainSeq">
+                <p:childTnLst>
+                  <p:par>
+                    <p:cTn id="3" fill="hold">
+                      <p:stCondLst>
+                        <p:cond delay="indefinite"/>
+                      </p:stCondLst>
+                      <p:childTnLst>
+                        <p:par>
+                          <p:cTn id="4" fill="hold">
+                            <p:stCondLst>
+                              <p:cond delay="0"/>
+                            </p:stCondLst>
+                            <p:childTnLst>
+                              <p:par>
+                                <p:cTn id="5" presetID="10" presetClass="entr" presetSubtype="0" fill="hold" nodeType="clickEffect">
+                                  <p:stCondLst>
+                                    <p:cond delay="0"/>
+                                  </p:stCondLst>
+                                  <p:childTnLst>
+                                    <p:set>
+                                      <p:cBhvr>
+                                        <p:cTn id="6" dur="1" fill="hold">
+                                          <p:stCondLst>
+                                            <p:cond delay="0"/>
+                                          </p:stCondLst>
+                                        </p:cTn>
+                                        <p:tgtEl>
+                                          <p:spTgt spid="9"/>
+                                        </p:tgtEl>
+                                        <p:attrNameLst>
+                                          <p:attrName>style.visibility</p:attrName>
+                                        </p:attrNameLst>
+                                      </p:cBhvr>
+                                      <p:to>
+                                        <p:strVal val="visible"/>
+                                      </p:to>
+                                    </p:set>
+                                    <p:animEffect transition="in" filter="fade">
+                                      <p:cBhvr>
+                                        <p:cTn id="7" dur="500"/>
+                                        <p:tgtEl>
+                                          <p:spTgt spid="9"/>
+                                        </p:tgtEl>
+                                      </p:cBhvr>
+                                    </p:animEffect>
+                                  </p:childTnLst>
+                                </p:cTn>
+                              </p:par>
+                            </p:childTnLst>
+                          </p:cTn>
+                        </p:par>
+                      </p:childTnLst>
+                    </p:cTn>
+                  </p:par>
+                </p:childTnLst>
+              </p:cTn>
+              <p:prevCondLst>
+                <p:cond evt="onPrev" delay="0">
+                  <p:tgtEl>
+                    <p:sldTgt/>
+                  </p:tgtEl>
+                </p:cond>
+              </p:prevCondLst>
+              <p:nextCondLst>
+                <p:cond evt="onNext" delay="0">
+                  <p:tgtEl>
+                    <p:sldTgt/>
+                  </p:tgtEl>
+                </p:cond>
+              </p:nextCondLst>
+            </p:seq>
+          </p:childTnLst>
+        </p:cTn>
+      </p:par>
+    </p:tnLst>
+  </p:timing>
+</p:sld>
+</file>
+
+<file path=ppt/slides/slide4.xml><?xml version="1.0" encoding="utf-8"?>
+<p:sld xmlns:a="http://schemas.openxmlformats.org/drawingml/2006/main" xmlns:r="http://schemas.openxmlformats.org/officeDocument/2006/relationships" xmlns:p="http://schemas.openxmlformats.org/presentationml/2006/main">
+  <p:cSld>
+    <p:spTree>
+      <p:nvGrpSpPr>
+        <p:cNvPr id="1" name=""/>
+        <p:cNvGrpSpPr/>
+        <p:nvPr/>
+      </p:nvGrpSpPr>
+      <p:grpSpPr>
+        <a:xfrm>
+          <a:off x="0" y="0"/>
+          <a:ext cx="0" cy="0"/>
+          <a:chOff x="0" y="0"/>
+          <a:chExt cx="0" cy="0"/>
+        </a:xfrm>
+      </p:grpSpPr>
+      <p:sp>
+        <p:nvSpPr>
+          <p:cNvPr id="2" name="Title 1"/>
+          <p:cNvSpPr>
+            <a:spLocks noGrp="1"/>
+          </p:cNvSpPr>
+          <p:nvPr>
+            <p:ph type="title"/>
+          </p:nvPr>
+        </p:nvSpPr>
+        <p:spPr>
+          <a:xfrm>
+            <a:off x="1484311" y="0"/>
+            <a:ext cx="10018713" cy="1752599"/>
+          </a:xfrm>
+        </p:spPr>
+        <p:txBody>
+          <a:bodyPr>
+            <a:normAutofit/>
+          </a:bodyPr>
+          <a:lstStyle/>
+          <a:p>
+            <a:r>
+              <a:rPr lang="en-CA" sz="5400" dirty="0"/>
+              <a:t>Tools Used</a:t>
+            </a:r>
+          </a:p>
+        </p:txBody>
+      </p:sp>
+      <p:pic>
+        <p:nvPicPr>
+          <p:cNvPr id="5" name="Content Placeholder 4"/>
+          <p:cNvPicPr>
+            <a:picLocks noGrp="1" noChangeAspect="1"/>
+          </p:cNvPicPr>
+          <p:nvPr>
+            <p:ph idx="1"/>
+          </p:nvPr>
+        </p:nvPicPr>
+        <p:blipFill>
+          <a:blip r:embed="rId2">
+            <a:extLst>
+              <a:ext uri="{28A0092B-C50C-407E-A947-70E740481C1C}">
+                <a14:useLocalDpi xmlns:a14="http://schemas.microsoft.com/office/drawing/2010/main" val="0"/>
+              </a:ext>
+            </a:extLst>
+          </a:blip>
+          <a:stretch>
+            <a:fillRect/>
+          </a:stretch>
+        </p:blipFill>
+        <p:spPr>
+          <a:xfrm>
+            <a:off x="1353843" y="2300835"/>
+            <a:ext cx="2593031" cy="3005755"/>
+          </a:xfrm>
+        </p:spPr>
+      </p:pic>
+      <p:sp>
+        <p:nvSpPr>
+          <p:cNvPr id="6" name="TextBox 5"/>
+          <p:cNvSpPr txBox="1"/>
+          <p:nvPr/>
+        </p:nvSpPr>
+        <p:spPr>
+          <a:xfrm>
+            <a:off x="1860575" y="5393162"/>
+            <a:ext cx="1913579" cy="461665"/>
+          </a:xfrm>
+          <a:prstGeom prst="rect">
+            <a:avLst/>
+          </a:prstGeom>
+          <a:noFill/>
+        </p:spPr>
+        <p:txBody>
+          <a:bodyPr wrap="square" rtlCol="0">
+            <a:spAutoFit/>
+          </a:bodyPr>
+          <a:lstStyle/>
+          <a:p>
+            <a:r>
+              <a:rPr lang="en-CA" sz="2400" dirty="0" err="1"/>
+              <a:t>Jupyter</a:t>
+            </a:r>
+            <a:r>
+              <a:rPr lang="en-CA" sz="2400" dirty="0"/>
+              <a:t> Lab</a:t>
+            </a:r>
+          </a:p>
+        </p:txBody>
+      </p:sp>
+      <p:sp>
+        <p:nvSpPr>
+          <p:cNvPr id="9" name="TextBox 8"/>
+          <p:cNvSpPr txBox="1"/>
+          <p:nvPr/>
+        </p:nvSpPr>
+        <p:spPr>
+          <a:xfrm>
+            <a:off x="7545926" y="6025621"/>
+            <a:ext cx="2603921" cy="461665"/>
+          </a:xfrm>
+          <a:prstGeom prst="rect">
+            <a:avLst/>
+          </a:prstGeom>
+          <a:noFill/>
+        </p:spPr>
+        <p:txBody>
+          <a:bodyPr wrap="square" rtlCol="0">
+            <a:spAutoFit/>
+          </a:bodyPr>
+          <a:lstStyle/>
+          <a:p>
+            <a:r>
+              <a:rPr lang="en-CA" sz="2400" dirty="0"/>
+              <a:t>Packages</a:t>
+            </a:r>
+          </a:p>
+        </p:txBody>
+      </p:sp>
+      <p:pic>
+        <p:nvPicPr>
+          <p:cNvPr id="11" name="Picture 10"/>
+          <p:cNvPicPr>
+            <a:picLocks noChangeAspect="1"/>
+          </p:cNvPicPr>
+          <p:nvPr/>
+        </p:nvPicPr>
+        <p:blipFill>
+          <a:blip r:embed="rId3">
+            <a:extLst>
+              <a:ext uri="{28A0092B-C50C-407E-A947-70E740481C1C}">
+                <a14:useLocalDpi xmlns:a14="http://schemas.microsoft.com/office/drawing/2010/main" val="0"/>
+              </a:ext>
+            </a:extLst>
+          </a:blip>
+          <a:stretch>
+            <a:fillRect/>
+          </a:stretch>
+        </p:blipFill>
+        <p:spPr>
+          <a:xfrm>
+            <a:off x="8969229" y="119007"/>
+            <a:ext cx="1922403" cy="744593"/>
+          </a:xfrm>
+          <a:prstGeom prst="rect">
+            <a:avLst/>
+          </a:prstGeom>
+          <a:noFill/>
+        </p:spPr>
+      </p:pic>
+      <p:pic>
+        <p:nvPicPr>
+          <p:cNvPr id="7" name="Picture 6"/>
+          <p:cNvPicPr>
+            <a:picLocks noChangeAspect="1"/>
+          </p:cNvPicPr>
+          <p:nvPr/>
+        </p:nvPicPr>
+        <p:blipFill>
+          <a:blip r:embed="rId4"/>
+          <a:stretch>
+            <a:fillRect/>
+          </a:stretch>
+        </p:blipFill>
+        <p:spPr>
+          <a:xfrm>
+            <a:off x="4926632" y="1674874"/>
+            <a:ext cx="6981825" cy="4257675"/>
+          </a:xfrm>
+          <a:prstGeom prst="rect">
+            <a:avLst/>
+          </a:prstGeom>
+        </p:spPr>
+      </p:pic>
+      <p:sp>
+        <p:nvSpPr>
+          <p:cNvPr id="10" name="Rectangle 9"/>
+          <p:cNvSpPr/>
+          <p:nvPr/>
+        </p:nvSpPr>
+        <p:spPr>
+          <a:xfrm>
+            <a:off x="5038247" y="1817112"/>
+            <a:ext cx="4590030" cy="1177547"/>
+          </a:xfrm>
+          <a:prstGeom prst="rect">
+            <a:avLst/>
+          </a:prstGeom>
+          <a:solidFill>
+            <a:srgbClr val="F5F5F5">
+              <a:alpha val="90000"/>
+            </a:srgbClr>
+          </a:solidFill>
+          <a:ln>
+            <a:noFill/>
+          </a:ln>
+        </p:spPr>
+        <p:style>
+          <a:lnRef idx="2">
+            <a:schemeClr val="accent1">
+              <a:shade val="50000"/>
+            </a:schemeClr>
+          </a:lnRef>
+          <a:fillRef idx="1">
+            <a:schemeClr val="accent1"/>
+          </a:fillRef>
+          <a:effectRef idx="0">
+            <a:schemeClr val="accent1"/>
+          </a:effectRef>
+          <a:fontRef idx="minor">
+            <a:schemeClr val="lt1"/>
+          </a:fontRef>
+        </p:style>
+        <p:txBody>
+          <a:bodyPr rtlCol="0" anchor="ctr"/>
+          <a:lstStyle/>
+          <a:p>
+            <a:pPr algn="ctr"/>
+            <a:endParaRPr lang="en-CA"/>
+          </a:p>
+        </p:txBody>
+      </p:sp>
+      <p:sp>
+        <p:nvSpPr>
+          <p:cNvPr id="12" name="Rectangle 11"/>
+          <p:cNvSpPr/>
+          <p:nvPr/>
+        </p:nvSpPr>
+        <p:spPr>
+          <a:xfrm>
+            <a:off x="5038246" y="3427474"/>
+            <a:ext cx="5660233" cy="378460"/>
+          </a:xfrm>
+          <a:prstGeom prst="rect">
+            <a:avLst/>
+          </a:prstGeom>
+          <a:solidFill>
+            <a:srgbClr val="F5F5F5">
+              <a:alpha val="90000"/>
+            </a:srgbClr>
+          </a:solidFill>
+          <a:ln>
+            <a:noFill/>
+          </a:ln>
+        </p:spPr>
+        <p:style>
+          <a:lnRef idx="2">
+            <a:schemeClr val="accent1">
+              <a:shade val="50000"/>
+            </a:schemeClr>
+          </a:lnRef>
+          <a:fillRef idx="1">
+            <a:schemeClr val="accent1"/>
+          </a:fillRef>
+          <a:effectRef idx="0">
+            <a:schemeClr val="accent1"/>
+          </a:effectRef>
+          <a:fontRef idx="minor">
+            <a:schemeClr val="lt1"/>
+          </a:fontRef>
+        </p:style>
+        <p:txBody>
+          <a:bodyPr rtlCol="0" anchor="ctr"/>
+          <a:lstStyle/>
+          <a:p>
+            <a:pPr algn="ctr"/>
+            <a:endParaRPr lang="en-CA"/>
+          </a:p>
+        </p:txBody>
+      </p:sp>
+      <p:pic>
+        <p:nvPicPr>
+          <p:cNvPr id="14" name="Picture 4" descr="Logos &amp; Attribution — The Movie Database (TMDb)"/>
+          <p:cNvPicPr>
+            <a:picLocks noChangeAspect="1" noChangeArrowheads="1"/>
+          </p:cNvPicPr>
+          <p:nvPr/>
+        </p:nvPicPr>
+        <p:blipFill>
+          <a:blip r:embed="rId5">
+            <a:extLst>
+              <a:ext uri="{28A0092B-C50C-407E-A947-70E740481C1C}">
+                <a14:useLocalDpi xmlns:a14="http://schemas.microsoft.com/office/drawing/2010/main" val="0"/>
+              </a:ext>
+            </a:extLst>
+          </a:blip>
+          <a:srcRect/>
+          <a:stretch>
+            <a:fillRect/>
+          </a:stretch>
+        </p:blipFill>
+        <p:spPr bwMode="auto">
+          <a:xfrm>
+            <a:off x="10967353" y="164060"/>
+            <a:ext cx="1071341" cy="947725"/>
+          </a:xfrm>
+          <a:prstGeom prst="rect">
+            <a:avLst/>
+          </a:prstGeom>
+          <a:noFill/>
+          <a:extLst>
+            <a:ext uri="{909E8E84-426E-40DD-AFC4-6F175D3DCCD1}">
+              <a14:hiddenFill xmlns:a14="http://schemas.microsoft.com/office/drawing/2010/main">
+                <a:solidFill>
+                  <a:srgbClr val="FFFFFF"/>
+                </a:solidFill>
+              </a14:hiddenFill>
+            </a:ext>
+          </a:extLst>
+        </p:spPr>
+      </p:pic>
+    </p:spTree>
+    <p:extLst>
+      <p:ext uri="{BB962C8B-B14F-4D97-AF65-F5344CB8AC3E}">
+        <p14:creationId xmlns:p14="http://schemas.microsoft.com/office/powerpoint/2010/main" val="3418948970"/>
+      </p:ext>
+    </p:extLst>
+  </p:cSld>
+  <p:clrMapOvr>
+    <a:masterClrMapping/>
+  </p:clrMapOvr>
+  <p:timing>
+    <p:tnLst>
+      <p:par>
+        <p:cTn id="1" dur="indefinite" restart="never" nodeType="tmRoot">
+          <p:childTnLst>
+            <p:seq concurrent="1" nextAc="seek">
+              <p:cTn id="2" dur="indefinite" nodeType="mainSeq">
+                <p:childTnLst>
+                  <p:par>
+                    <p:cTn id="3" fill="hold">
+                      <p:stCondLst>
+                        <p:cond delay="indefinite"/>
+                      </p:stCondLst>
+                      <p:childTnLst>
+                        <p:par>
+                          <p:cTn id="4" fill="hold">
+                            <p:stCondLst>
+                              <p:cond delay="0"/>
+                            </p:stCondLst>
+                            <p:childTnLst>
+                              <p:par>
+                                <p:cTn id="5" presetID="10" presetClass="entr" presetSubtype="0" fill="hold" grpId="0" nodeType="clickEffect">
+                                  <p:stCondLst>
+                                    <p:cond delay="0"/>
+                                  </p:stCondLst>
+                                  <p:childTnLst>
+                                    <p:set>
+                                      <p:cBhvr>
+                                        <p:cTn id="6" dur="1" fill="hold">
+                                          <p:stCondLst>
+                                            <p:cond delay="0"/>
+                                          </p:stCondLst>
+                                        </p:cTn>
+                                        <p:tgtEl>
+                                          <p:spTgt spid="10"/>
+                                        </p:tgtEl>
+                                        <p:attrNameLst>
+                                          <p:attrName>style.visibility</p:attrName>
+                                        </p:attrNameLst>
+                                      </p:cBhvr>
+                                      <p:to>
+                                        <p:strVal val="visible"/>
+                                      </p:to>
+                                    </p:set>
+                                    <p:animEffect transition="in" filter="fade">
+                                      <p:cBhvr>
+                                        <p:cTn id="7" dur="500"/>
+                                        <p:tgtEl>
+                                          <p:spTgt spid="10"/>
+                                        </p:tgtEl>
+                                      </p:cBhvr>
+                                    </p:animEffect>
+                                  </p:childTnLst>
+                                </p:cTn>
+                              </p:par>
+                              <p:par>
+                                <p:cTn id="8" presetID="10" presetClass="entr" presetSubtype="0" fill="hold" grpId="0" nodeType="withEffect">
+                                  <p:stCondLst>
+                                    <p:cond delay="0"/>
+                                  </p:stCondLst>
+                                  <p:childTnLst>
+                                    <p:set>
+                                      <p:cBhvr>
+                                        <p:cTn id="9" dur="1" fill="hold">
+                                          <p:stCondLst>
+                                            <p:cond delay="0"/>
+                                          </p:stCondLst>
+                                        </p:cTn>
+                                        <p:tgtEl>
+                                          <p:spTgt spid="12"/>
+                                        </p:tgtEl>
+                                        <p:attrNameLst>
+                                          <p:attrName>style.visibility</p:attrName>
+                                        </p:attrNameLst>
+                                      </p:cBhvr>
+                                      <p:to>
+                                        <p:strVal val="visible"/>
+                                      </p:to>
+                                    </p:set>
+                                    <p:animEffect transition="in" filter="fade">
+                                      <p:cBhvr>
+                                        <p:cTn id="10" dur="500"/>
+                                        <p:tgtEl>
+                                          <p:spTgt spid="12"/>
+                                        </p:tgtEl>
+                                      </p:cBhvr>
+                                    </p:animEffect>
+                                  </p:childTnLst>
+                                </p:cTn>
+                              </p:par>
+                            </p:childTnLst>
+                          </p:cTn>
+                        </p:par>
+                      </p:childTnLst>
+                    </p:cTn>
+                  </p:par>
+                </p:childTnLst>
+              </p:cTn>
+              <p:prevCondLst>
+                <p:cond evt="onPrev" delay="0">
+                  <p:tgtEl>
+                    <p:sldTgt/>
+                  </p:tgtEl>
+                </p:cond>
+              </p:prevCondLst>
+              <p:nextCondLst>
+                <p:cond evt="onNext" delay="0">
+                  <p:tgtEl>
+                    <p:sldTgt/>
+                  </p:tgtEl>
+                </p:cond>
+              </p:nextCondLst>
+            </p:seq>
+          </p:childTnLst>
+        </p:cTn>
+      </p:par>
+    </p:tnLst>
+    <p:bldLst>
+      <p:bldP spid="10" grpId="0" animBg="1"/>
+      <p:bldP spid="12" grpId="0" animBg="1"/>
+    </p:bldLst>
+  </p:timing>
+</p:sld>
+</file>
+
+<file path=ppt/slides/slide5.xml><?xml version="1.0" encoding="utf-8"?>
+<p:sld xmlns:a="http://schemas.openxmlformats.org/drawingml/2006/main" xmlns:r="http://schemas.openxmlformats.org/officeDocument/2006/relationships" xmlns:p="http://schemas.openxmlformats.org/presentationml/2006/main">
+  <p:cSld>
+    <p:spTree>
+      <p:nvGrpSpPr>
+        <p:cNvPr id="1" name=""/>
+        <p:cNvGrpSpPr/>
+        <p:nvPr/>
+      </p:nvGrpSpPr>
+      <p:grpSpPr>
+        <a:xfrm>
+          <a:off x="0" y="0"/>
+          <a:ext cx="0" cy="0"/>
+          <a:chOff x="0" y="0"/>
+          <a:chExt cx="0" cy="0"/>
+        </a:xfrm>
+      </p:grpSpPr>
+      <p:sp>
+        <p:nvSpPr>
+          <p:cNvPr id="2" name="Title 1"/>
+          <p:cNvSpPr>
+            <a:spLocks noGrp="1"/>
+          </p:cNvSpPr>
+          <p:nvPr>
+            <p:ph type="title"/>
+          </p:nvPr>
+        </p:nvSpPr>
+        <p:spPr>
+          <a:xfrm>
+            <a:off x="1484311" y="0"/>
+            <a:ext cx="10018713" cy="1752599"/>
+          </a:xfrm>
+        </p:spPr>
+        <p:txBody>
+          <a:bodyPr>
+            <a:normAutofit/>
+          </a:bodyPr>
+          <a:lstStyle/>
+          <a:p>
+            <a:r>
+              <a:rPr lang="en-CA" sz="5400" dirty="0"/>
+              <a:t>Results</a:t>
             </a:r>
           </a:p>
         </p:txBody>
@@ -6381,20 +7608,343 @@
           <a:noFill/>
         </p:spPr>
       </p:pic>
+      <p:sp>
+        <p:nvSpPr>
+          <p:cNvPr id="8" name="Content Placeholder 7"/>
+          <p:cNvSpPr>
+            <a:spLocks noGrp="1"/>
+          </p:cNvSpPr>
+          <p:nvPr>
+            <p:ph idx="1"/>
+          </p:nvPr>
+        </p:nvSpPr>
+        <p:spPr>
+          <a:xfrm>
+            <a:off x="1484310" y="1752599"/>
+            <a:ext cx="10018713" cy="3124201"/>
+          </a:xfrm>
+        </p:spPr>
+        <p:txBody>
+          <a:bodyPr anchor="t">
+            <a:normAutofit/>
+          </a:bodyPr>
+          <a:lstStyle/>
+          <a:p>
+            <a:r>
+              <a:rPr lang="en-CA" sz="3600" dirty="0"/>
+              <a:t>Bike Stations</a:t>
+            </a:r>
+          </a:p>
+        </p:txBody>
+      </p:sp>
+      <p:pic>
+        <p:nvPicPr>
+          <p:cNvPr id="1028" name="Picture 4" descr="https://s-media-cache-ak0.pinimg.com/originals/c2/6e/99/c26e991593d6479ee4af4e6f1529dbce.png"/>
+          <p:cNvPicPr>
+            <a:picLocks noChangeAspect="1" noChangeArrowheads="1"/>
+          </p:cNvPicPr>
+          <p:nvPr/>
+        </p:nvPicPr>
+        <p:blipFill>
+          <a:blip r:embed="rId3">
+            <a:extLst>
+              <a:ext uri="{28A0092B-C50C-407E-A947-70E740481C1C}">
+                <a14:useLocalDpi xmlns:a14="http://schemas.microsoft.com/office/drawing/2010/main" val="0"/>
+              </a:ext>
+            </a:extLst>
+          </a:blip>
+          <a:srcRect/>
+          <a:stretch>
+            <a:fillRect/>
+          </a:stretch>
+        </p:blipFill>
+        <p:spPr bwMode="auto">
+          <a:xfrm flipH="1">
+            <a:off x="8215584" y="4394703"/>
+            <a:ext cx="4123366" cy="2310897"/>
+          </a:xfrm>
+          <a:prstGeom prst="rect">
+            <a:avLst/>
+          </a:prstGeom>
+          <a:noFill/>
+          <a:extLst>
+            <a:ext uri="{909E8E84-426E-40DD-AFC4-6F175D3DCCD1}">
+              <a14:hiddenFill xmlns:a14="http://schemas.microsoft.com/office/drawing/2010/main">
+                <a:solidFill>
+                  <a:srgbClr val="FFFFFF"/>
+                </a:solidFill>
+              </a14:hiddenFill>
+            </a:ext>
+          </a:extLst>
+        </p:spPr>
+      </p:pic>
+      <p:pic>
+        <p:nvPicPr>
+          <p:cNvPr id="4" name="Picture 3"/>
+          <p:cNvPicPr>
+            <a:picLocks noChangeAspect="1"/>
+          </p:cNvPicPr>
+          <p:nvPr/>
+        </p:nvPicPr>
+        <p:blipFill>
+          <a:blip r:embed="rId4"/>
+          <a:stretch>
+            <a:fillRect/>
+          </a:stretch>
+        </p:blipFill>
+        <p:spPr>
+          <a:xfrm>
+            <a:off x="91440" y="2695573"/>
+            <a:ext cx="11658600" cy="809625"/>
+          </a:xfrm>
+          <a:prstGeom prst="rect">
+            <a:avLst/>
+          </a:prstGeom>
+        </p:spPr>
+      </p:pic>
+      <p:pic>
+        <p:nvPicPr>
+          <p:cNvPr id="6" name="Picture 5"/>
+          <p:cNvPicPr>
+            <a:picLocks noChangeAspect="1"/>
+          </p:cNvPicPr>
+          <p:nvPr/>
+        </p:nvPicPr>
+        <p:blipFill>
+          <a:blip r:embed="rId5"/>
+          <a:stretch>
+            <a:fillRect/>
+          </a:stretch>
+        </p:blipFill>
+        <p:spPr>
+          <a:xfrm>
+            <a:off x="91440" y="3488053"/>
+            <a:ext cx="5772150" cy="438150"/>
+          </a:xfrm>
+          <a:prstGeom prst="rect">
+            <a:avLst/>
+          </a:prstGeom>
+        </p:spPr>
+      </p:pic>
+      <p:pic>
+        <p:nvPicPr>
+          <p:cNvPr id="11" name="Picture 10"/>
+          <p:cNvPicPr>
+            <a:picLocks noChangeAspect="1"/>
+          </p:cNvPicPr>
+          <p:nvPr/>
+        </p:nvPicPr>
+        <p:blipFill>
+          <a:blip r:embed="rId6"/>
+          <a:stretch>
+            <a:fillRect/>
+          </a:stretch>
+        </p:blipFill>
+        <p:spPr>
+          <a:xfrm>
+            <a:off x="91440" y="3894769"/>
+            <a:ext cx="7886700" cy="361950"/>
+          </a:xfrm>
+          <a:prstGeom prst="rect">
+            <a:avLst/>
+          </a:prstGeom>
+        </p:spPr>
+      </p:pic>
     </p:spTree>
     <p:extLst>
       <p:ext uri="{BB962C8B-B14F-4D97-AF65-F5344CB8AC3E}">
-        <p14:creationId xmlns:p14="http://schemas.microsoft.com/office/powerpoint/2010/main" val="14362895"/>
+        <p14:creationId xmlns:p14="http://schemas.microsoft.com/office/powerpoint/2010/main" val="2995662968"/>
       </p:ext>
     </p:extLst>
   </p:cSld>
   <p:clrMapOvr>
     <a:masterClrMapping/>
   </p:clrMapOvr>
+  <p:timing>
+    <p:tnLst>
+      <p:par>
+        <p:cTn id="1" dur="indefinite" restart="never" nodeType="tmRoot">
+          <p:childTnLst>
+            <p:seq concurrent="1" nextAc="seek">
+              <p:cTn id="2" dur="indefinite" nodeType="mainSeq">
+                <p:childTnLst>
+                  <p:par>
+                    <p:cTn id="3" fill="hold">
+                      <p:stCondLst>
+                        <p:cond delay="indefinite"/>
+                      </p:stCondLst>
+                      <p:childTnLst>
+                        <p:par>
+                          <p:cTn id="4" fill="hold">
+                            <p:stCondLst>
+                              <p:cond delay="0"/>
+                            </p:stCondLst>
+                            <p:childTnLst>
+                              <p:par>
+                                <p:cTn id="5" presetID="10" presetClass="entr" presetSubtype="0" fill="hold" nodeType="clickEffect">
+                                  <p:stCondLst>
+                                    <p:cond delay="0"/>
+                                  </p:stCondLst>
+                                  <p:childTnLst>
+                                    <p:set>
+                                      <p:cBhvr>
+                                        <p:cTn id="6" dur="1" fill="hold">
+                                          <p:stCondLst>
+                                            <p:cond delay="0"/>
+                                          </p:stCondLst>
+                                        </p:cTn>
+                                        <p:tgtEl>
+                                          <p:spTgt spid="4"/>
+                                        </p:tgtEl>
+                                        <p:attrNameLst>
+                                          <p:attrName>style.visibility</p:attrName>
+                                        </p:attrNameLst>
+                                      </p:cBhvr>
+                                      <p:to>
+                                        <p:strVal val="visible"/>
+                                      </p:to>
+                                    </p:set>
+                                    <p:animEffect transition="in" filter="fade">
+                                      <p:cBhvr>
+                                        <p:cTn id="7" dur="500"/>
+                                        <p:tgtEl>
+                                          <p:spTgt spid="4"/>
+                                        </p:tgtEl>
+                                      </p:cBhvr>
+                                    </p:animEffect>
+                                  </p:childTnLst>
+                                </p:cTn>
+                              </p:par>
+                            </p:childTnLst>
+                          </p:cTn>
+                        </p:par>
+                      </p:childTnLst>
+                    </p:cTn>
+                  </p:par>
+                  <p:par>
+                    <p:cTn id="8" fill="hold">
+                      <p:stCondLst>
+                        <p:cond delay="indefinite"/>
+                      </p:stCondLst>
+                      <p:childTnLst>
+                        <p:par>
+                          <p:cTn id="9" fill="hold">
+                            <p:stCondLst>
+                              <p:cond delay="0"/>
+                            </p:stCondLst>
+                            <p:childTnLst>
+                              <p:par>
+                                <p:cTn id="10" presetID="10" presetClass="entr" presetSubtype="0" fill="hold" nodeType="clickEffect">
+                                  <p:stCondLst>
+                                    <p:cond delay="0"/>
+                                  </p:stCondLst>
+                                  <p:childTnLst>
+                                    <p:set>
+                                      <p:cBhvr>
+                                        <p:cTn id="11" dur="1" fill="hold">
+                                          <p:stCondLst>
+                                            <p:cond delay="0"/>
+                                          </p:stCondLst>
+                                        </p:cTn>
+                                        <p:tgtEl>
+                                          <p:spTgt spid="6"/>
+                                        </p:tgtEl>
+                                        <p:attrNameLst>
+                                          <p:attrName>style.visibility</p:attrName>
+                                        </p:attrNameLst>
+                                      </p:cBhvr>
+                                      <p:to>
+                                        <p:strVal val="visible"/>
+                                      </p:to>
+                                    </p:set>
+                                    <p:animEffect transition="in" filter="fade">
+                                      <p:cBhvr>
+                                        <p:cTn id="12" dur="500"/>
+                                        <p:tgtEl>
+                                          <p:spTgt spid="6"/>
+                                        </p:tgtEl>
+                                      </p:cBhvr>
+                                    </p:animEffect>
+                                  </p:childTnLst>
+                                </p:cTn>
+                              </p:par>
+                            </p:childTnLst>
+                          </p:cTn>
+                        </p:par>
+                      </p:childTnLst>
+                    </p:cTn>
+                  </p:par>
+                  <p:par>
+                    <p:cTn id="13" fill="hold">
+                      <p:stCondLst>
+                        <p:cond delay="indefinite"/>
+                      </p:stCondLst>
+                      <p:childTnLst>
+                        <p:par>
+                          <p:cTn id="14" fill="hold">
+                            <p:stCondLst>
+                              <p:cond delay="0"/>
+                            </p:stCondLst>
+                            <p:childTnLst>
+                              <p:par>
+                                <p:cTn id="15" presetID="1" presetClass="entr" presetSubtype="0" fill="hold" nodeType="clickEffect">
+                                  <p:stCondLst>
+                                    <p:cond delay="0"/>
+                                  </p:stCondLst>
+                                  <p:childTnLst>
+                                    <p:set>
+                                      <p:cBhvr>
+                                        <p:cTn id="16" dur="1" fill="hold">
+                                          <p:stCondLst>
+                                            <p:cond delay="0"/>
+                                          </p:stCondLst>
+                                        </p:cTn>
+                                        <p:tgtEl>
+                                          <p:spTgt spid="11"/>
+                                        </p:tgtEl>
+                                        <p:attrNameLst>
+                                          <p:attrName>style.visibility</p:attrName>
+                                        </p:attrNameLst>
+                                      </p:cBhvr>
+                                      <p:to>
+                                        <p:strVal val="visible"/>
+                                      </p:to>
+                                    </p:set>
+                                  </p:childTnLst>
+                                </p:cTn>
+                              </p:par>
+                            </p:childTnLst>
+                          </p:cTn>
+                        </p:par>
+                      </p:childTnLst>
+                    </p:cTn>
+                  </p:par>
+                </p:childTnLst>
+              </p:cTn>
+              <p:prevCondLst>
+                <p:cond evt="onPrev" delay="0">
+                  <p:tgtEl>
+                    <p:sldTgt/>
+                  </p:tgtEl>
+                </p:cond>
+              </p:prevCondLst>
+              <p:nextCondLst>
+                <p:cond evt="onNext" delay="0">
+                  <p:tgtEl>
+                    <p:sldTgt/>
+                  </p:tgtEl>
+                </p:cond>
+              </p:nextCondLst>
+            </p:seq>
+          </p:childTnLst>
+        </p:cTn>
+      </p:par>
+    </p:tnLst>
+  </p:timing>
 </p:sld>
 </file>
 
-<file path=ppt/slides/slide3.xml><?xml version="1.0" encoding="utf-8"?>
+<file path=ppt/slides/slide6.xml><?xml version="1.0" encoding="utf-8"?>
 <p:sld xmlns:a="http://schemas.openxmlformats.org/drawingml/2006/main" xmlns:r="http://schemas.openxmlformats.org/officeDocument/2006/relationships" xmlns:p="http://schemas.openxmlformats.org/presentationml/2006/main">
   <p:cSld>
     <p:spTree>
@@ -6435,171 +7985,287 @@
           <a:p>
             <a:r>
               <a:rPr lang="en-CA" sz="5400" dirty="0"/>
-              <a:t>Tools Used</a:t>
+              <a:t>Results</a:t>
+            </a:r>
+          </a:p>
+        </p:txBody>
+      </p:sp>
+      <p:sp>
+        <p:nvSpPr>
+          <p:cNvPr id="8" name="Content Placeholder 7"/>
+          <p:cNvSpPr>
+            <a:spLocks noGrp="1"/>
+          </p:cNvSpPr>
+          <p:nvPr>
+            <p:ph idx="1"/>
+          </p:nvPr>
+        </p:nvSpPr>
+        <p:spPr>
+          <a:xfrm>
+            <a:off x="1484310" y="1753200"/>
+            <a:ext cx="10018713" cy="3124201"/>
+          </a:xfrm>
+        </p:spPr>
+        <p:txBody>
+          <a:bodyPr anchor="t">
+            <a:normAutofit lnSpcReduction="10000"/>
+          </a:bodyPr>
+          <a:lstStyle/>
+          <a:p>
+            <a:r>
+              <a:rPr lang="en-CA" sz="3600" dirty="0"/>
+              <a:t>Favorite Movie Analysis:</a:t>
+            </a:r>
+          </a:p>
+          <a:p>
+            <a:pPr lvl="1"/>
+            <a:r>
+              <a:rPr lang="en-CA" sz="3200" i="1" dirty="0"/>
+              <a:t>The Good, the Bad and the Ugly</a:t>
+            </a:r>
+            <a:r>
+              <a:rPr lang="en-CA" sz="3200" dirty="0"/>
+              <a:t> (1966)</a:t>
+            </a:r>
+          </a:p>
+          <a:p>
+            <a:pPr lvl="1"/>
+            <a:r>
+              <a:rPr lang="en-CA" sz="3200" i="1" dirty="0"/>
+              <a:t>The Shining</a:t>
+            </a:r>
+            <a:r>
+              <a:rPr lang="en-CA" sz="3200" dirty="0"/>
+              <a:t> (1980)</a:t>
+            </a:r>
+          </a:p>
+          <a:p>
+            <a:pPr lvl="1"/>
+            <a:r>
+              <a:rPr lang="en-CA" sz="3200" i="1" dirty="0"/>
+              <a:t>The Dark Knight</a:t>
+            </a:r>
+            <a:r>
+              <a:rPr lang="en-CA" sz="3200" dirty="0"/>
+              <a:t> (2008)</a:t>
+            </a:r>
+          </a:p>
+          <a:p>
+            <a:pPr lvl="1"/>
+            <a:r>
+              <a:rPr lang="en-CA" sz="3200" i="1" dirty="0"/>
+              <a:t>Inception</a:t>
+            </a:r>
+            <a:r>
+              <a:rPr lang="en-CA" sz="3200" dirty="0"/>
+              <a:t> (2010)</a:t>
             </a:r>
           </a:p>
         </p:txBody>
       </p:sp>
       <p:pic>
         <p:nvPicPr>
-          <p:cNvPr id="5" name="Content Placeholder 4"/>
+          <p:cNvPr id="4098" name="Picture 2" descr="http://purepng.com/public/uploads/large/purepng.com-film-reelobjectsfilm-reelcamera-object-tape-movie-film-cinema-picture-video-reel-strip-631522326002pifem.png"/>
           <p:cNvPicPr>
-            <a:picLocks noGrp="1" noChangeAspect="1"/>
+            <a:picLocks noChangeAspect="1" noChangeArrowheads="1"/>
           </p:cNvPicPr>
-          <p:nvPr>
-            <p:ph idx="1"/>
-          </p:nvPr>
+          <p:nvPr/>
         </p:nvPicPr>
         <p:blipFill>
-          <a:blip r:embed="rId2">
+          <a:blip r:embed="rId3">
             <a:extLst>
               <a:ext uri="{28A0092B-C50C-407E-A947-70E740481C1C}">
                 <a14:useLocalDpi xmlns:a14="http://schemas.microsoft.com/office/drawing/2010/main" val="0"/>
               </a:ext>
             </a:extLst>
           </a:blip>
+          <a:srcRect/>
+          <a:stretch>
+            <a:fillRect/>
+          </a:stretch>
+        </p:blipFill>
+        <p:spPr bwMode="auto">
+          <a:xfrm>
+            <a:off x="8834755" y="4778669"/>
+            <a:ext cx="3143885" cy="2079331"/>
+          </a:xfrm>
+          <a:prstGeom prst="rect">
+            <a:avLst/>
+          </a:prstGeom>
+          <a:noFill/>
+          <a:extLst>
+            <a:ext uri="{909E8E84-426E-40DD-AFC4-6F175D3DCCD1}">
+              <a14:hiddenFill xmlns:a14="http://schemas.microsoft.com/office/drawing/2010/main">
+                <a:solidFill>
+                  <a:srgbClr val="FFFFFF"/>
+                </a:solidFill>
+              </a14:hiddenFill>
+            </a:ext>
+          </a:extLst>
+        </p:spPr>
+      </p:pic>
+      <p:pic>
+        <p:nvPicPr>
+          <p:cNvPr id="9" name="Picture 8"/>
+          <p:cNvPicPr>
+            <a:picLocks noChangeAspect="1"/>
+          </p:cNvPicPr>
+          <p:nvPr/>
+        </p:nvPicPr>
+        <p:blipFill>
+          <a:blip r:embed="rId4"/>
           <a:stretch>
             <a:fillRect/>
           </a:stretch>
         </p:blipFill>
         <p:spPr>
           <a:xfrm>
-            <a:off x="2543623" y="2300835"/>
-            <a:ext cx="2593031" cy="3005755"/>
-          </a:xfrm>
-        </p:spPr>
-      </p:pic>
-      <p:sp>
-        <p:nvSpPr>
-          <p:cNvPr id="6" name="TextBox 5"/>
-          <p:cNvSpPr txBox="1"/>
-          <p:nvPr/>
-        </p:nvSpPr>
-        <p:spPr>
-          <a:xfrm>
-            <a:off x="3050355" y="5393162"/>
-            <a:ext cx="1913579" cy="461665"/>
-          </a:xfrm>
-          <a:prstGeom prst="rect">
-            <a:avLst/>
-          </a:prstGeom>
-          <a:noFill/>
-        </p:spPr>
-        <p:txBody>
-          <a:bodyPr wrap="square" rtlCol="0">
-            <a:spAutoFit/>
-          </a:bodyPr>
-          <a:lstStyle/>
-          <a:p>
-            <a:r>
-              <a:rPr lang="en-CA" sz="2400" dirty="0" err="1"/>
-              <a:t>Jupyter</a:t>
-            </a:r>
-            <a:r>
-              <a:rPr lang="en-CA" sz="2400" dirty="0"/>
-              <a:t> Lab</a:t>
-            </a:r>
-          </a:p>
-        </p:txBody>
-      </p:sp>
-      <p:pic>
-        <p:nvPicPr>
-          <p:cNvPr id="8" name="Picture 7"/>
-          <p:cNvPicPr>
-            <a:picLocks noChangeAspect="1"/>
-          </p:cNvPicPr>
-          <p:nvPr/>
-        </p:nvPicPr>
-        <p:blipFill>
-          <a:blip r:embed="rId3"/>
-          <a:stretch>
-            <a:fillRect/>
-          </a:stretch>
-        </p:blipFill>
-        <p:spPr>
-          <a:xfrm>
-            <a:off x="7201941" y="3133516"/>
-            <a:ext cx="3819525" cy="1457325"/>
+            <a:off x="91447" y="5170170"/>
+            <a:ext cx="10058400" cy="800100"/>
           </a:xfrm>
           <a:prstGeom prst="rect">
             <a:avLst/>
           </a:prstGeom>
         </p:spPr>
       </p:pic>
-      <p:sp>
-        <p:nvSpPr>
-          <p:cNvPr id="9" name="TextBox 8"/>
-          <p:cNvSpPr txBox="1"/>
-          <p:nvPr/>
-        </p:nvSpPr>
-        <p:spPr>
-          <a:xfrm>
-            <a:off x="8417545" y="5393161"/>
-            <a:ext cx="2603921" cy="461665"/>
-          </a:xfrm>
-          <a:prstGeom prst="rect">
-            <a:avLst/>
-          </a:prstGeom>
-          <a:noFill/>
-        </p:spPr>
-        <p:txBody>
-          <a:bodyPr wrap="square" rtlCol="0">
-            <a:spAutoFit/>
-          </a:bodyPr>
-          <a:lstStyle/>
-          <a:p>
-            <a:r>
-              <a:rPr lang="en-CA" sz="2400" dirty="0"/>
-              <a:t>Packages</a:t>
-            </a:r>
-          </a:p>
-        </p:txBody>
-      </p:sp>
       <p:pic>
         <p:nvPicPr>
-          <p:cNvPr id="11" name="Picture 10"/>
+          <p:cNvPr id="4100" name="Picture 4" descr="Logos &amp; Attribution — The Movie Database (TMDb)"/>
           <p:cNvPicPr>
-            <a:picLocks noChangeAspect="1"/>
+            <a:picLocks noChangeAspect="1" noChangeArrowheads="1"/>
           </p:cNvPicPr>
           <p:nvPr/>
         </p:nvPicPr>
         <p:blipFill>
-          <a:blip r:embed="rId4">
+          <a:blip r:embed="rId5">
             <a:extLst>
               <a:ext uri="{28A0092B-C50C-407E-A947-70E740481C1C}">
                 <a14:useLocalDpi xmlns:a14="http://schemas.microsoft.com/office/drawing/2010/main" val="0"/>
               </a:ext>
             </a:extLst>
           </a:blip>
+          <a:srcRect/>
           <a:stretch>
             <a:fillRect/>
           </a:stretch>
         </p:blipFill>
-        <p:spPr>
+        <p:spPr bwMode="auto">
           <a:xfrm>
-            <a:off x="10149847" y="119007"/>
-            <a:ext cx="1922403" cy="744593"/>
+            <a:off x="10907299" y="166386"/>
+            <a:ext cx="1071341" cy="947725"/>
           </a:xfrm>
           <a:prstGeom prst="rect">
             <a:avLst/>
           </a:prstGeom>
           <a:noFill/>
+          <a:extLst>
+            <a:ext uri="{909E8E84-426E-40DD-AFC4-6F175D3DCCD1}">
+              <a14:hiddenFill xmlns:a14="http://schemas.microsoft.com/office/drawing/2010/main">
+                <a:solidFill>
+                  <a:srgbClr val="FFFFFF"/>
+                </a:solidFill>
+              </a14:hiddenFill>
+            </a:ext>
+          </a:extLst>
         </p:spPr>
       </p:pic>
     </p:spTree>
     <p:extLst>
       <p:ext uri="{BB962C8B-B14F-4D97-AF65-F5344CB8AC3E}">
-        <p14:creationId xmlns:p14="http://schemas.microsoft.com/office/powerpoint/2010/main" val="3418948970"/>
+        <p14:creationId xmlns:p14="http://schemas.microsoft.com/office/powerpoint/2010/main" val="2909256239"/>
       </p:ext>
     </p:extLst>
   </p:cSld>
   <p:clrMapOvr>
     <a:masterClrMapping/>
   </p:clrMapOvr>
+  <p:timing>
+    <p:tnLst>
+      <p:par>
+        <p:cTn id="1" dur="indefinite" restart="never" nodeType="tmRoot">
+          <p:childTnLst>
+            <p:seq concurrent="1" nextAc="seek">
+              <p:cTn id="2" dur="indefinite" nodeType="mainSeq">
+                <p:childTnLst>
+                  <p:par>
+                    <p:cTn id="3" fill="hold">
+                      <p:stCondLst>
+                        <p:cond delay="indefinite"/>
+                      </p:stCondLst>
+                      <p:childTnLst>
+                        <p:par>
+                          <p:cTn id="4" fill="hold">
+                            <p:stCondLst>
+                              <p:cond delay="0"/>
+                            </p:stCondLst>
+                            <p:childTnLst>
+                              <p:par>
+                                <p:cTn id="5" presetID="10" presetClass="entr" presetSubtype="0" fill="hold" nodeType="clickEffect">
+                                  <p:stCondLst>
+                                    <p:cond delay="0"/>
+                                  </p:stCondLst>
+                                  <p:childTnLst>
+                                    <p:set>
+                                      <p:cBhvr>
+                                        <p:cTn id="6" dur="1" fill="hold">
+                                          <p:stCondLst>
+                                            <p:cond delay="0"/>
+                                          </p:stCondLst>
+                                        </p:cTn>
+                                        <p:tgtEl>
+                                          <p:spTgt spid="9"/>
+                                        </p:tgtEl>
+                                        <p:attrNameLst>
+                                          <p:attrName>style.visibility</p:attrName>
+                                        </p:attrNameLst>
+                                      </p:cBhvr>
+                                      <p:to>
+                                        <p:strVal val="visible"/>
+                                      </p:to>
+                                    </p:set>
+                                    <p:animEffect transition="in" filter="fade">
+                                      <p:cBhvr>
+                                        <p:cTn id="7" dur="500"/>
+                                        <p:tgtEl>
+                                          <p:spTgt spid="9"/>
+                                        </p:tgtEl>
+                                      </p:cBhvr>
+                                    </p:animEffect>
+                                  </p:childTnLst>
+                                </p:cTn>
+                              </p:par>
+                            </p:childTnLst>
+                          </p:cTn>
+                        </p:par>
+                      </p:childTnLst>
+                    </p:cTn>
+                  </p:par>
+                </p:childTnLst>
+              </p:cTn>
+              <p:prevCondLst>
+                <p:cond evt="onPrev" delay="0">
+                  <p:tgtEl>
+                    <p:sldTgt/>
+                  </p:tgtEl>
+                </p:cond>
+              </p:prevCondLst>
+              <p:nextCondLst>
+                <p:cond evt="onNext" delay="0">
+                  <p:tgtEl>
+                    <p:sldTgt/>
+                  </p:tgtEl>
+                </p:cond>
+              </p:nextCondLst>
+            </p:seq>
+          </p:childTnLst>
+        </p:cTn>
+      </p:par>
+    </p:tnLst>
+  </p:timing>
 </p:sld>
 </file>
 
-<file path=ppt/slides/slide4.xml><?xml version="1.0" encoding="utf-8"?>
+<file path=ppt/slides/slide7.xml><?xml version="1.0" encoding="utf-8"?>
 <p:sld xmlns:a="http://schemas.openxmlformats.org/drawingml/2006/main" xmlns:r="http://schemas.openxmlformats.org/officeDocument/2006/relationships" xmlns:p="http://schemas.openxmlformats.org/presentationml/2006/main">
   <p:cSld>
     <p:spTree>
@@ -6645,11 +8311,221 @@
           </a:p>
         </p:txBody>
       </p:sp>
+      <p:sp>
+        <p:nvSpPr>
+          <p:cNvPr id="8" name="Content Placeholder 7"/>
+          <p:cNvSpPr>
+            <a:spLocks noGrp="1"/>
+          </p:cNvSpPr>
+          <p:nvPr>
+            <p:ph idx="1"/>
+          </p:nvPr>
+        </p:nvSpPr>
+        <p:spPr>
+          <a:xfrm>
+            <a:off x="1484310" y="1066799"/>
+            <a:ext cx="10018713" cy="3124201"/>
+          </a:xfrm>
+        </p:spPr>
+        <p:txBody>
+          <a:bodyPr anchor="t">
+            <a:normAutofit/>
+          </a:bodyPr>
+          <a:lstStyle/>
+          <a:p>
+            <a:r>
+              <a:rPr lang="en-CA" sz="3600" dirty="0"/>
+              <a:t>Movie Analysis</a:t>
+            </a:r>
+          </a:p>
+        </p:txBody>
+      </p:sp>
       <p:pic>
         <p:nvPicPr>
-          <p:cNvPr id="5" name="Picture 4"/>
+          <p:cNvPr id="7" name="Picture 6"/>
           <p:cNvPicPr>
             <a:picLocks noChangeAspect="1"/>
+          </p:cNvPicPr>
+          <p:nvPr/>
+        </p:nvPicPr>
+        <p:blipFill>
+          <a:blip r:embed="rId2"/>
+          <a:stretch>
+            <a:fillRect/>
+          </a:stretch>
+        </p:blipFill>
+        <p:spPr>
+          <a:xfrm>
+            <a:off x="1620456" y="289368"/>
+            <a:ext cx="9069145" cy="6340182"/>
+          </a:xfrm>
+          <a:prstGeom prst="rect">
+            <a:avLst/>
+          </a:prstGeom>
+        </p:spPr>
+      </p:pic>
+      <p:pic>
+        <p:nvPicPr>
+          <p:cNvPr id="9" name="Picture 4" descr="Logos &amp; Attribution — The Movie Database (TMDb)"/>
+          <p:cNvPicPr>
+            <a:picLocks noChangeAspect="1" noChangeArrowheads="1"/>
+          </p:cNvPicPr>
+          <p:nvPr/>
+        </p:nvPicPr>
+        <p:blipFill>
+          <a:blip r:embed="rId3">
+            <a:extLst>
+              <a:ext uri="{28A0092B-C50C-407E-A947-70E740481C1C}">
+                <a14:useLocalDpi xmlns:a14="http://schemas.microsoft.com/office/drawing/2010/main" val="0"/>
+              </a:ext>
+            </a:extLst>
+          </a:blip>
+          <a:srcRect/>
+          <a:stretch>
+            <a:fillRect/>
+          </a:stretch>
+        </p:blipFill>
+        <p:spPr bwMode="auto">
+          <a:xfrm>
+            <a:off x="10907299" y="166386"/>
+            <a:ext cx="1071341" cy="947725"/>
+          </a:xfrm>
+          <a:prstGeom prst="rect">
+            <a:avLst/>
+          </a:prstGeom>
+          <a:noFill/>
+          <a:extLst>
+            <a:ext uri="{909E8E84-426E-40DD-AFC4-6F175D3DCCD1}">
+              <a14:hiddenFill xmlns:a14="http://schemas.microsoft.com/office/drawing/2010/main">
+                <a:solidFill>
+                  <a:srgbClr val="FFFFFF"/>
+                </a:solidFill>
+              </a14:hiddenFill>
+            </a:ext>
+          </a:extLst>
+        </p:spPr>
+      </p:pic>
+    </p:spTree>
+    <p:extLst>
+      <p:ext uri="{BB962C8B-B14F-4D97-AF65-F5344CB8AC3E}">
+        <p14:creationId xmlns:p14="http://schemas.microsoft.com/office/powerpoint/2010/main" val="3641208054"/>
+      </p:ext>
+    </p:extLst>
+  </p:cSld>
+  <p:clrMapOvr>
+    <a:masterClrMapping/>
+  </p:clrMapOvr>
+</p:sld>
+</file>
+
+<file path=ppt/slides/slide8.xml><?xml version="1.0" encoding="utf-8"?>
+<p:sld xmlns:a="http://schemas.openxmlformats.org/drawingml/2006/main" xmlns:r="http://schemas.openxmlformats.org/officeDocument/2006/relationships" xmlns:p="http://schemas.openxmlformats.org/presentationml/2006/main">
+  <p:cSld>
+    <p:spTree>
+      <p:nvGrpSpPr>
+        <p:cNvPr id="1" name=""/>
+        <p:cNvGrpSpPr/>
+        <p:nvPr/>
+      </p:nvGrpSpPr>
+      <p:grpSpPr>
+        <a:xfrm>
+          <a:off x="0" y="0"/>
+          <a:ext cx="0" cy="0"/>
+          <a:chOff x="0" y="0"/>
+          <a:chExt cx="0" cy="0"/>
+        </a:xfrm>
+      </p:grpSpPr>
+      <p:sp>
+        <p:nvSpPr>
+          <p:cNvPr id="2" name="Title 1"/>
+          <p:cNvSpPr>
+            <a:spLocks noGrp="1"/>
+          </p:cNvSpPr>
+          <p:nvPr>
+            <p:ph type="title"/>
+          </p:nvPr>
+        </p:nvSpPr>
+        <p:spPr>
+          <a:xfrm>
+            <a:off x="1484311" y="0"/>
+            <a:ext cx="10018713" cy="1752599"/>
+          </a:xfrm>
+        </p:spPr>
+        <p:txBody>
+          <a:bodyPr>
+            <a:normAutofit/>
+          </a:bodyPr>
+          <a:lstStyle/>
+          <a:p>
+            <a:r>
+              <a:rPr lang="en-CA" sz="5400" dirty="0"/>
+              <a:t>Challenges</a:t>
+            </a:r>
+          </a:p>
+        </p:txBody>
+      </p:sp>
+      <p:sp>
+        <p:nvSpPr>
+          <p:cNvPr id="8" name="Content Placeholder 7"/>
+          <p:cNvSpPr>
+            <a:spLocks noGrp="1"/>
+          </p:cNvSpPr>
+          <p:nvPr>
+            <p:ph idx="1"/>
+          </p:nvPr>
+        </p:nvSpPr>
+        <p:spPr>
+          <a:xfrm>
+            <a:off x="1484310" y="1752599"/>
+            <a:ext cx="10018713" cy="3863332"/>
+          </a:xfrm>
+        </p:spPr>
+        <p:txBody>
+          <a:bodyPr anchor="t">
+            <a:normAutofit/>
+          </a:bodyPr>
+          <a:lstStyle/>
+          <a:p>
+            <a:r>
+              <a:rPr lang="en-CA" sz="3600" dirty="0"/>
+              <a:t>API documentation</a:t>
+            </a:r>
+          </a:p>
+          <a:p>
+            <a:pPr marL="0" indent="0">
+              <a:buNone/>
+            </a:pPr>
+            <a:endParaRPr lang="en-CA" sz="3600" dirty="0"/>
+          </a:p>
+          <a:p>
+            <a:r>
+              <a:rPr lang="en-CA" sz="3600" dirty="0"/>
+              <a:t>Parsing</a:t>
+            </a:r>
+          </a:p>
+          <a:p>
+            <a:endParaRPr lang="en-CA" sz="3600" dirty="0"/>
+          </a:p>
+          <a:p>
+            <a:r>
+              <a:rPr lang="en-CA" sz="3600" dirty="0" err="1"/>
+              <a:t>Pythonic</a:t>
+            </a:r>
+            <a:r>
+              <a:rPr lang="en-CA" sz="3600" dirty="0"/>
+              <a:t> Coding</a:t>
+            </a:r>
+          </a:p>
+          <a:p>
+            <a:endParaRPr lang="en-CA" sz="3600" dirty="0"/>
+          </a:p>
+        </p:txBody>
+      </p:sp>
+      <p:pic>
+        <p:nvPicPr>
+          <p:cNvPr id="6146" name="Picture 2" descr="https://clipground.com/images/confused-emoji-png-15.png"/>
+          <p:cNvPicPr>
+            <a:picLocks noChangeAspect="1" noChangeArrowheads="1"/>
           </p:cNvPicPr>
           <p:nvPr/>
         </p:nvPicPr>
@@ -6661,44 +8537,35 @@
               </a:ext>
             </a:extLst>
           </a:blip>
+          <a:srcRect/>
           <a:stretch>
             <a:fillRect/>
           </a:stretch>
         </p:blipFill>
-        <p:spPr>
+        <p:spPr bwMode="auto">
           <a:xfrm>
-            <a:off x="10149847" y="119007"/>
-            <a:ext cx="1922403" cy="744593"/>
+            <a:off x="10604314" y="5615931"/>
+            <a:ext cx="1013468" cy="1013468"/>
           </a:xfrm>
           <a:prstGeom prst="rect">
             <a:avLst/>
           </a:prstGeom>
           <a:noFill/>
+          <a:extLst>
+            <a:ext uri="{909E8E84-426E-40DD-AFC4-6F175D3DCCD1}">
+              <a14:hiddenFill xmlns:a14="http://schemas.microsoft.com/office/drawing/2010/main">
+                <a:solidFill>
+                  <a:srgbClr val="FFFFFF"/>
+                </a:solidFill>
+              </a14:hiddenFill>
+            </a:ext>
+          </a:extLst>
         </p:spPr>
       </p:pic>
-      <p:sp>
-        <p:nvSpPr>
-          <p:cNvPr id="8" name="Content Placeholder 7"/>
-          <p:cNvSpPr>
-            <a:spLocks noGrp="1"/>
-          </p:cNvSpPr>
-          <p:nvPr>
-            <p:ph idx="1"/>
-          </p:nvPr>
-        </p:nvSpPr>
-        <p:spPr/>
-        <p:txBody>
-          <a:bodyPr/>
-          <a:lstStyle/>
-          <a:p>
-            <a:endParaRPr lang="en-CA" dirty="0"/>
-          </a:p>
-        </p:txBody>
-      </p:sp>
     </p:spTree>
     <p:extLst>
       <p:ext uri="{BB962C8B-B14F-4D97-AF65-F5344CB8AC3E}">
-        <p14:creationId xmlns:p14="http://schemas.microsoft.com/office/powerpoint/2010/main" val="2995662968"/>
+        <p14:creationId xmlns:p14="http://schemas.microsoft.com/office/powerpoint/2010/main" val="1960209316"/>
       </p:ext>
     </p:extLst>
   </p:cSld>
@@ -6962,4 +8829,299 @@
     </a:ext>
   </a:extLst>
 </a:theme>
+</file>
+
+<file path=ppt/theme/theme2.xml><?xml version="1.0" encoding="utf-8"?>
+<a:theme xmlns:a="http://schemas.openxmlformats.org/drawingml/2006/main" name="Office Theme">
+  <a:themeElements>
+    <a:clrScheme name="Office">
+      <a:dk1>
+        <a:sysClr val="windowText" lastClr="000000"/>
+      </a:dk1>
+      <a:lt1>
+        <a:sysClr val="window" lastClr="FFFFFF"/>
+      </a:lt1>
+      <a:dk2>
+        <a:srgbClr val="44546A"/>
+      </a:dk2>
+      <a:lt2>
+        <a:srgbClr val="E7E6E6"/>
+      </a:lt2>
+      <a:accent1>
+        <a:srgbClr val="5B9BD5"/>
+      </a:accent1>
+      <a:accent2>
+        <a:srgbClr val="ED7D31"/>
+      </a:accent2>
+      <a:accent3>
+        <a:srgbClr val="A5A5A5"/>
+      </a:accent3>
+      <a:accent4>
+        <a:srgbClr val="FFC000"/>
+      </a:accent4>
+      <a:accent5>
+        <a:srgbClr val="4472C4"/>
+      </a:accent5>
+      <a:accent6>
+        <a:srgbClr val="70AD47"/>
+      </a:accent6>
+      <a:hlink>
+        <a:srgbClr val="0563C1"/>
+      </a:hlink>
+      <a:folHlink>
+        <a:srgbClr val="954F72"/>
+      </a:folHlink>
+    </a:clrScheme>
+    <a:fontScheme name="Office">
+      <a:majorFont>
+        <a:latin typeface="Calibri Light" panose="020F0302020204030204"/>
+        <a:ea typeface=""/>
+        <a:cs typeface=""/>
+        <a:font script="Jpan" typeface="游ゴシック Light"/>
+        <a:font script="Hang" typeface="맑은 고딕"/>
+        <a:font script="Hans" typeface="等线 Light"/>
+        <a:font script="Hant" typeface="新細明體"/>
+        <a:font script="Arab" typeface="Times New Roman"/>
+        <a:font script="Hebr" typeface="Times New Roman"/>
+        <a:font script="Thai" typeface="Angsana New"/>
+        <a:font script="Ethi" typeface="Nyala"/>
+        <a:font script="Beng" typeface="Vrinda"/>
+        <a:font script="Gujr" typeface="Shruti"/>
+        <a:font script="Khmr" typeface="MoolBoran"/>
+        <a:font script="Knda" typeface="Tunga"/>
+        <a:font script="Guru" typeface="Raavi"/>
+        <a:font script="Cans" typeface="Euphemia"/>
+        <a:font script="Cher" typeface="Plantagenet Cherokee"/>
+        <a:font script="Yiii" typeface="Microsoft Yi Baiti"/>
+        <a:font script="Tibt" typeface="Microsoft Himalaya"/>
+        <a:font script="Thaa" typeface="MV Boli"/>
+        <a:font script="Deva" typeface="Mangal"/>
+        <a:font script="Telu" typeface="Gautami"/>
+        <a:font script="Taml" typeface="Latha"/>
+        <a:font script="Syrc" typeface="Estrangelo Edessa"/>
+        <a:font script="Orya" typeface="Kalinga"/>
+        <a:font script="Mlym" typeface="Kartika"/>
+        <a:font script="Laoo" typeface="DokChampa"/>
+        <a:font script="Sinh" typeface="Iskoola Pota"/>
+        <a:font script="Mong" typeface="Mongolian Baiti"/>
+        <a:font script="Viet" typeface="Times New Roman"/>
+        <a:font script="Uigh" typeface="Microsoft Uighur"/>
+        <a:font script="Geor" typeface="Sylfaen"/>
+        <a:font script="Armn" typeface="Arial"/>
+        <a:font script="Bugi" typeface="Leelawadee UI"/>
+        <a:font script="Bopo" typeface="Microsoft JhengHei"/>
+        <a:font script="Java" typeface="Javanese Text"/>
+        <a:font script="Lisu" typeface="Segoe UI"/>
+        <a:font script="Mymr" typeface="Myanmar Text"/>
+        <a:font script="Nkoo" typeface="Ebrima"/>
+        <a:font script="Olck" typeface="Nirmala UI"/>
+        <a:font script="Osma" typeface="Ebrima"/>
+        <a:font script="Phag" typeface="Phagspa"/>
+        <a:font script="Syrn" typeface="Estrangelo Edessa"/>
+        <a:font script="Syrj" typeface="Estrangelo Edessa"/>
+        <a:font script="Syre" typeface="Estrangelo Edessa"/>
+        <a:font script="Sora" typeface="Nirmala UI"/>
+        <a:font script="Tale" typeface="Microsoft Tai Le"/>
+        <a:font script="Talu" typeface="Microsoft New Tai Lue"/>
+        <a:font script="Tfng" typeface="Ebrima"/>
+      </a:majorFont>
+      <a:minorFont>
+        <a:latin typeface="Calibri" panose="020F0502020204030204"/>
+        <a:ea typeface=""/>
+        <a:cs typeface=""/>
+        <a:font script="Jpan" typeface="游ゴシック"/>
+        <a:font script="Hang" typeface="맑은 고딕"/>
+        <a:font script="Hans" typeface="等线"/>
+        <a:font script="Hant" typeface="新細明體"/>
+        <a:font script="Arab" typeface="Arial"/>
+        <a:font script="Hebr" typeface="Arial"/>
+        <a:font script="Thai" typeface="Cordia New"/>
+        <a:font script="Ethi" typeface="Nyala"/>
+        <a:font script="Beng" typeface="Vrinda"/>
+        <a:font script="Gujr" typeface="Shruti"/>
+        <a:font script="Khmr" typeface="DaunPenh"/>
+        <a:font script="Knda" typeface="Tunga"/>
+        <a:font script="Guru" typeface="Raavi"/>
+        <a:font script="Cans" typeface="Euphemia"/>
+        <a:font script="Cher" typeface="Plantagenet Cherokee"/>
+        <a:font script="Yiii" typeface="Microsoft Yi Baiti"/>
+        <a:font script="Tibt" typeface="Microsoft Himalaya"/>
+        <a:font script="Thaa" typeface="MV Boli"/>
+        <a:font script="Deva" typeface="Mangal"/>
+        <a:font script="Telu" typeface="Gautami"/>
+        <a:font script="Taml" typeface="Latha"/>
+        <a:font script="Syrc" typeface="Estrangelo Edessa"/>
+        <a:font script="Orya" typeface="Kalinga"/>
+        <a:font script="Mlym" typeface="Kartika"/>
+        <a:font script="Laoo" typeface="DokChampa"/>
+        <a:font script="Sinh" typeface="Iskoola Pota"/>
+        <a:font script="Mong" typeface="Mongolian Baiti"/>
+        <a:font script="Viet" typeface="Arial"/>
+        <a:font script="Uigh" typeface="Microsoft Uighur"/>
+        <a:font script="Geor" typeface="Sylfaen"/>
+        <a:font script="Armn" typeface="Arial"/>
+        <a:font script="Bugi" typeface="Leelawadee UI"/>
+        <a:font script="Bopo" typeface="Microsoft JhengHei"/>
+        <a:font script="Java" typeface="Javanese Text"/>
+        <a:font script="Lisu" typeface="Segoe UI"/>
+        <a:font script="Mymr" typeface="Myanmar Text"/>
+        <a:font script="Nkoo" typeface="Ebrima"/>
+        <a:font script="Olck" typeface="Nirmala UI"/>
+        <a:font script="Osma" typeface="Ebrima"/>
+        <a:font script="Phag" typeface="Phagspa"/>
+        <a:font script="Syrn" typeface="Estrangelo Edessa"/>
+        <a:font script="Syrj" typeface="Estrangelo Edessa"/>
+        <a:font script="Syre" typeface="Estrangelo Edessa"/>
+        <a:font script="Sora" typeface="Nirmala UI"/>
+        <a:font script="Tale" typeface="Microsoft Tai Le"/>
+        <a:font script="Talu" typeface="Microsoft New Tai Lue"/>
+        <a:font script="Tfng" typeface="Ebrima"/>
+      </a:minorFont>
+    </a:fontScheme>
+    <a:fmtScheme name="Office">
+      <a:fillStyleLst>
+        <a:solidFill>
+          <a:schemeClr val="phClr"/>
+        </a:solidFill>
+        <a:gradFill rotWithShape="1">
+          <a:gsLst>
+            <a:gs pos="0">
+              <a:schemeClr val="phClr">
+                <a:lumMod val="110000"/>
+                <a:satMod val="105000"/>
+                <a:tint val="67000"/>
+              </a:schemeClr>
+            </a:gs>
+            <a:gs pos="50000">
+              <a:schemeClr val="phClr">
+                <a:lumMod val="105000"/>
+                <a:satMod val="103000"/>
+                <a:tint val="73000"/>
+              </a:schemeClr>
+            </a:gs>
+            <a:gs pos="100000">
+              <a:schemeClr val="phClr">
+                <a:lumMod val="105000"/>
+                <a:satMod val="109000"/>
+                <a:tint val="81000"/>
+              </a:schemeClr>
+            </a:gs>
+          </a:gsLst>
+          <a:lin ang="5400000" scaled="0"/>
+        </a:gradFill>
+        <a:gradFill rotWithShape="1">
+          <a:gsLst>
+            <a:gs pos="0">
+              <a:schemeClr val="phClr">
+                <a:satMod val="103000"/>
+                <a:lumMod val="102000"/>
+                <a:tint val="94000"/>
+              </a:schemeClr>
+            </a:gs>
+            <a:gs pos="50000">
+              <a:schemeClr val="phClr">
+                <a:satMod val="110000"/>
+                <a:lumMod val="100000"/>
+                <a:shade val="100000"/>
+              </a:schemeClr>
+            </a:gs>
+            <a:gs pos="100000">
+              <a:schemeClr val="phClr">
+                <a:lumMod val="99000"/>
+                <a:satMod val="120000"/>
+                <a:shade val="78000"/>
+              </a:schemeClr>
+            </a:gs>
+          </a:gsLst>
+          <a:lin ang="5400000" scaled="0"/>
+        </a:gradFill>
+      </a:fillStyleLst>
+      <a:lnStyleLst>
+        <a:ln w="6350" cap="flat" cmpd="sng" algn="ctr">
+          <a:solidFill>
+            <a:schemeClr val="phClr"/>
+          </a:solidFill>
+          <a:prstDash val="solid"/>
+          <a:miter lim="800000"/>
+        </a:ln>
+        <a:ln w="12700" cap="flat" cmpd="sng" algn="ctr">
+          <a:solidFill>
+            <a:schemeClr val="phClr"/>
+          </a:solidFill>
+          <a:prstDash val="solid"/>
+          <a:miter lim="800000"/>
+        </a:ln>
+        <a:ln w="19050" cap="flat" cmpd="sng" algn="ctr">
+          <a:solidFill>
+            <a:schemeClr val="phClr"/>
+          </a:solidFill>
+          <a:prstDash val="solid"/>
+          <a:miter lim="800000"/>
+        </a:ln>
+      </a:lnStyleLst>
+      <a:effectStyleLst>
+        <a:effectStyle>
+          <a:effectLst/>
+        </a:effectStyle>
+        <a:effectStyle>
+          <a:effectLst/>
+        </a:effectStyle>
+        <a:effectStyle>
+          <a:effectLst>
+            <a:outerShdw blurRad="57150" dist="19050" dir="5400000" algn="ctr" rotWithShape="0">
+              <a:srgbClr val="000000">
+                <a:alpha val="63000"/>
+              </a:srgbClr>
+            </a:outerShdw>
+          </a:effectLst>
+        </a:effectStyle>
+      </a:effectStyleLst>
+      <a:bgFillStyleLst>
+        <a:solidFill>
+          <a:schemeClr val="phClr"/>
+        </a:solidFill>
+        <a:solidFill>
+          <a:schemeClr val="phClr">
+            <a:tint val="95000"/>
+            <a:satMod val="170000"/>
+          </a:schemeClr>
+        </a:solidFill>
+        <a:gradFill rotWithShape="1">
+          <a:gsLst>
+            <a:gs pos="0">
+              <a:schemeClr val="phClr">
+                <a:tint val="93000"/>
+                <a:satMod val="150000"/>
+                <a:shade val="98000"/>
+                <a:lumMod val="102000"/>
+              </a:schemeClr>
+            </a:gs>
+            <a:gs pos="50000">
+              <a:schemeClr val="phClr">
+                <a:tint val="98000"/>
+                <a:satMod val="130000"/>
+                <a:shade val="90000"/>
+                <a:lumMod val="103000"/>
+              </a:schemeClr>
+            </a:gs>
+            <a:gs pos="100000">
+              <a:schemeClr val="phClr">
+                <a:shade val="63000"/>
+                <a:satMod val="120000"/>
+              </a:schemeClr>
+            </a:gs>
+          </a:gsLst>
+          <a:lin ang="5400000" scaled="0"/>
+        </a:gradFill>
+      </a:bgFillStyleLst>
+    </a:fmtScheme>
+  </a:themeElements>
+  <a:objectDefaults/>
+  <a:extraClrSchemeLst/>
+  <a:extLst>
+    <a:ext uri="{05A4C25C-085E-4340-85A3-A5531E510DB2}">
+      <thm15:themeFamily xmlns:thm15="http://schemas.microsoft.com/office/thememl/2012/main" name="Office Theme" id="{62F939B6-93AF-4DB8-9C6B-D6C7DFDC589F}" vid="{4A3C46E8-61CC-4603-A589-7422A47A8E4A}"/>
+    </a:ext>
+  </a:extLst>
+</a:theme>
 </file>
</xml_diff>

<commit_message>
Day 5 final updates
</commit_message>
<xml_diff>
--- a/Week_1/Day_4/Transport for London API Miniproject.pptx
+++ b/Week_1/Day_4/Transport for London API Miniproject.pptx
@@ -204,7 +204,7 @@
           <a:p>
             <a:fld id="{81A8A069-BA3D-46A6-8556-56944FDB635F}" type="datetimeFigureOut">
               <a:rPr lang="en-CA" smtClean="0"/>
-              <a:t>7/22/2021</a:t>
+              <a:t>7/23/2021</a:t>
             </a:fld>
             <a:endParaRPr lang="en-CA"/>
           </a:p>
@@ -524,6 +524,19 @@
               <a:rPr lang="en-CA" baseline="0" dirty="0"/>
               <a:t> to yourself on this slide</a:t>
             </a:r>
+          </a:p>
+          <a:p>
+            <a:endParaRPr lang="en-CA" baseline="0" dirty="0"/>
+          </a:p>
+          <a:p>
+            <a:r>
+              <a:rPr lang="en-CA" baseline="0" dirty="0"/>
+              <a:t>Feedback: could have maybe used world population to normalize movie revenue. Make note of </a:t>
+            </a:r>
+            <a:r>
+              <a:rPr lang="en-CA" baseline="0"/>
+              <a:t>key insights.</a:t>
+            </a:r>
             <a:endParaRPr lang="en-CA" dirty="0"/>
           </a:p>
         </p:txBody>
@@ -639,6 +652,207 @@
     <p:extLst>
       <p:ext uri="{BB962C8B-B14F-4D97-AF65-F5344CB8AC3E}">
         <p14:creationId xmlns:p14="http://schemas.microsoft.com/office/powerpoint/2010/main" val="3435551363"/>
+      </p:ext>
+    </p:extLst>
+  </p:cSld>
+  <p:clrMapOvr>
+    <a:masterClrMapping/>
+  </p:clrMapOvr>
+</p:notes>
+</file>
+
+<file path=ppt/notesSlides/notesSlide3.xml><?xml version="1.0" encoding="utf-8"?>
+<p:notes xmlns:a="http://schemas.openxmlformats.org/drawingml/2006/main" xmlns:r="http://schemas.openxmlformats.org/officeDocument/2006/relationships" xmlns:p="http://schemas.openxmlformats.org/presentationml/2006/main">
+  <p:cSld>
+    <p:spTree>
+      <p:nvGrpSpPr>
+        <p:cNvPr id="1" name=""/>
+        <p:cNvGrpSpPr/>
+        <p:nvPr/>
+      </p:nvGrpSpPr>
+      <p:grpSpPr>
+        <a:xfrm>
+          <a:off x="0" y="0"/>
+          <a:ext cx="0" cy="0"/>
+          <a:chOff x="0" y="0"/>
+          <a:chExt cx="0" cy="0"/>
+        </a:xfrm>
+      </p:grpSpPr>
+      <p:sp>
+        <p:nvSpPr>
+          <p:cNvPr id="2" name="Slide Image Placeholder 1"/>
+          <p:cNvSpPr>
+            <a:spLocks noGrp="1" noRot="1" noChangeAspect="1"/>
+          </p:cNvSpPr>
+          <p:nvPr>
+            <p:ph type="sldImg"/>
+          </p:nvPr>
+        </p:nvSpPr>
+        <p:spPr/>
+      </p:sp>
+      <p:sp>
+        <p:nvSpPr>
+          <p:cNvPr id="3" name="Notes Placeholder 2"/>
+          <p:cNvSpPr>
+            <a:spLocks noGrp="1"/>
+          </p:cNvSpPr>
+          <p:nvPr>
+            <p:ph type="body" idx="1"/>
+          </p:nvPr>
+        </p:nvSpPr>
+        <p:spPr/>
+        <p:txBody>
+          <a:bodyPr/>
+          <a:lstStyle/>
+          <a:p>
+            <a:pPr marL="171450" indent="-171450">
+              <a:buFontTx/>
+              <a:buChar char="-"/>
+            </a:pPr>
+            <a:r>
+              <a:rPr lang="en-CA" dirty="0"/>
+              <a:t>$1 Billion!</a:t>
+            </a:r>
+          </a:p>
+          <a:p>
+            <a:pPr marL="171450" indent="-171450">
+              <a:buFontTx/>
+              <a:buChar char="-"/>
+            </a:pPr>
+            <a:r>
+              <a:rPr lang="en-CA" dirty="0"/>
+              <a:t>Nobody agreed</a:t>
+            </a:r>
+            <a:r>
+              <a:rPr lang="en-CA" baseline="0" dirty="0"/>
+              <a:t> with me</a:t>
+            </a:r>
+            <a:endParaRPr lang="en-CA" dirty="0"/>
+          </a:p>
+        </p:txBody>
+      </p:sp>
+      <p:sp>
+        <p:nvSpPr>
+          <p:cNvPr id="4" name="Slide Number Placeholder 3"/>
+          <p:cNvSpPr>
+            <a:spLocks noGrp="1"/>
+          </p:cNvSpPr>
+          <p:nvPr>
+            <p:ph type="sldNum" sz="quarter" idx="10"/>
+          </p:nvPr>
+        </p:nvSpPr>
+        <p:spPr/>
+        <p:txBody>
+          <a:bodyPr/>
+          <a:lstStyle/>
+          <a:p>
+            <a:fld id="{188F1977-5685-4D41-84BF-DDDC42B2FD8A}" type="slidenum">
+              <a:rPr lang="en-CA" smtClean="0"/>
+              <a:t>7</a:t>
+            </a:fld>
+            <a:endParaRPr lang="en-CA"/>
+          </a:p>
+        </p:txBody>
+      </p:sp>
+    </p:spTree>
+    <p:extLst>
+      <p:ext uri="{BB962C8B-B14F-4D97-AF65-F5344CB8AC3E}">
+        <p14:creationId xmlns:p14="http://schemas.microsoft.com/office/powerpoint/2010/main" val="3649236685"/>
+      </p:ext>
+    </p:extLst>
+  </p:cSld>
+  <p:clrMapOvr>
+    <a:masterClrMapping/>
+  </p:clrMapOvr>
+</p:notes>
+</file>
+
+<file path=ppt/notesSlides/notesSlide4.xml><?xml version="1.0" encoding="utf-8"?>
+<p:notes xmlns:a="http://schemas.openxmlformats.org/drawingml/2006/main" xmlns:r="http://schemas.openxmlformats.org/officeDocument/2006/relationships" xmlns:p="http://schemas.openxmlformats.org/presentationml/2006/main">
+  <p:cSld>
+    <p:spTree>
+      <p:nvGrpSpPr>
+        <p:cNvPr id="1" name=""/>
+        <p:cNvGrpSpPr/>
+        <p:nvPr/>
+      </p:nvGrpSpPr>
+      <p:grpSpPr>
+        <a:xfrm>
+          <a:off x="0" y="0"/>
+          <a:ext cx="0" cy="0"/>
+          <a:chOff x="0" y="0"/>
+          <a:chExt cx="0" cy="0"/>
+        </a:xfrm>
+      </p:grpSpPr>
+      <p:sp>
+        <p:nvSpPr>
+          <p:cNvPr id="2" name="Slide Image Placeholder 1"/>
+          <p:cNvSpPr>
+            <a:spLocks noGrp="1" noRot="1" noChangeAspect="1"/>
+          </p:cNvSpPr>
+          <p:nvPr>
+            <p:ph type="sldImg"/>
+          </p:nvPr>
+        </p:nvSpPr>
+        <p:spPr/>
+      </p:sp>
+      <p:sp>
+        <p:nvSpPr>
+          <p:cNvPr id="3" name="Notes Placeholder 2"/>
+          <p:cNvSpPr>
+            <a:spLocks noGrp="1"/>
+          </p:cNvSpPr>
+          <p:nvPr>
+            <p:ph type="body" idx="1"/>
+          </p:nvPr>
+        </p:nvSpPr>
+        <p:spPr/>
+        <p:txBody>
+          <a:bodyPr/>
+          <a:lstStyle/>
+          <a:p>
+            <a:r>
+              <a:rPr lang="en-CA" dirty="0"/>
+              <a:t>If I had more time: </a:t>
+            </a:r>
+            <a:r>
+              <a:rPr lang="en-CA" dirty="0" err="1"/>
+              <a:t>pythonic</a:t>
+            </a:r>
+            <a:r>
+              <a:rPr lang="en-CA" dirty="0"/>
+              <a:t> coding, additional movie stats</a:t>
+            </a:r>
+          </a:p>
+        </p:txBody>
+      </p:sp>
+      <p:sp>
+        <p:nvSpPr>
+          <p:cNvPr id="4" name="Slide Number Placeholder 3"/>
+          <p:cNvSpPr>
+            <a:spLocks noGrp="1"/>
+          </p:cNvSpPr>
+          <p:nvPr>
+            <p:ph type="sldNum" sz="quarter" idx="10"/>
+          </p:nvPr>
+        </p:nvSpPr>
+        <p:spPr/>
+        <p:txBody>
+          <a:bodyPr/>
+          <a:lstStyle/>
+          <a:p>
+            <a:fld id="{188F1977-5685-4D41-84BF-DDDC42B2FD8A}" type="slidenum">
+              <a:rPr lang="en-CA" smtClean="0"/>
+              <a:t>8</a:t>
+            </a:fld>
+            <a:endParaRPr lang="en-CA"/>
+          </a:p>
+        </p:txBody>
+      </p:sp>
+    </p:spTree>
+    <p:extLst>
+      <p:ext uri="{BB962C8B-B14F-4D97-AF65-F5344CB8AC3E}">
+        <p14:creationId xmlns:p14="http://schemas.microsoft.com/office/powerpoint/2010/main" val="951164770"/>
       </p:ext>
     </p:extLst>
   </p:cSld>
@@ -1150,7 +1364,7 @@
           <a:p>
             <a:fld id="{52A40D1F-8DC8-452B-B505-1D78AF183F5D}" type="datetimeFigureOut">
               <a:rPr lang="en-CA" smtClean="0"/>
-              <a:t>7/22/2021</a:t>
+              <a:t>7/23/2021</a:t>
             </a:fld>
             <a:endParaRPr lang="en-CA"/>
           </a:p>
@@ -1446,7 +1660,7 @@
           <a:p>
             <a:fld id="{52A40D1F-8DC8-452B-B505-1D78AF183F5D}" type="datetimeFigureOut">
               <a:rPr lang="en-CA" smtClean="0"/>
-              <a:t>7/22/2021</a:t>
+              <a:t>7/23/2021</a:t>
             </a:fld>
             <a:endParaRPr lang="en-CA"/>
           </a:p>
@@ -1694,7 +1908,7 @@
           <a:p>
             <a:fld id="{52A40D1F-8DC8-452B-B505-1D78AF183F5D}" type="datetimeFigureOut">
               <a:rPr lang="en-CA" smtClean="0"/>
-              <a:t>7/22/2021</a:t>
+              <a:t>7/23/2021</a:t>
             </a:fld>
             <a:endParaRPr lang="en-CA"/>
           </a:p>
@@ -2234,7 +2448,7 @@
           <a:p>
             <a:fld id="{52A40D1F-8DC8-452B-B505-1D78AF183F5D}" type="datetimeFigureOut">
               <a:rPr lang="en-CA" smtClean="0"/>
-              <a:t>7/22/2021</a:t>
+              <a:t>7/23/2021</a:t>
             </a:fld>
             <a:endParaRPr lang="en-CA"/>
           </a:p>
@@ -2482,7 +2696,7 @@
           <a:p>
             <a:fld id="{52A40D1F-8DC8-452B-B505-1D78AF183F5D}" type="datetimeFigureOut">
               <a:rPr lang="en-CA" smtClean="0"/>
-              <a:t>7/22/2021</a:t>
+              <a:t>7/23/2021</a:t>
             </a:fld>
             <a:endParaRPr lang="en-CA"/>
           </a:p>
@@ -3014,7 +3228,7 @@
           <a:p>
             <a:fld id="{52A40D1F-8DC8-452B-B505-1D78AF183F5D}" type="datetimeFigureOut">
               <a:rPr lang="en-CA" smtClean="0"/>
-              <a:t>7/22/2021</a:t>
+              <a:t>7/23/2021</a:t>
             </a:fld>
             <a:endParaRPr lang="en-CA"/>
           </a:p>
@@ -3311,7 +3525,7 @@
           <a:p>
             <a:fld id="{52A40D1F-8DC8-452B-B505-1D78AF183F5D}" type="datetimeFigureOut">
               <a:rPr lang="en-CA" smtClean="0"/>
-              <a:t>7/22/2021</a:t>
+              <a:t>7/23/2021</a:t>
             </a:fld>
             <a:endParaRPr lang="en-CA"/>
           </a:p>
@@ -3485,7 +3699,7 @@
           <a:p>
             <a:fld id="{52A40D1F-8DC8-452B-B505-1D78AF183F5D}" type="datetimeFigureOut">
               <a:rPr lang="en-CA" smtClean="0"/>
-              <a:t>7/22/2021</a:t>
+              <a:t>7/23/2021</a:t>
             </a:fld>
             <a:endParaRPr lang="en-CA"/>
           </a:p>
@@ -3665,7 +3879,7 @@
           <a:p>
             <a:fld id="{52A40D1F-8DC8-452B-B505-1D78AF183F5D}" type="datetimeFigureOut">
               <a:rPr lang="en-CA" smtClean="0"/>
-              <a:t>7/22/2021</a:t>
+              <a:t>7/23/2021</a:t>
             </a:fld>
             <a:endParaRPr lang="en-CA"/>
           </a:p>
@@ -3835,7 +4049,7 @@
           <a:p>
             <a:fld id="{52A40D1F-8DC8-452B-B505-1D78AF183F5D}" type="datetimeFigureOut">
               <a:rPr lang="en-CA" smtClean="0"/>
-              <a:t>7/22/2021</a:t>
+              <a:t>7/23/2021</a:t>
             </a:fld>
             <a:endParaRPr lang="en-CA"/>
           </a:p>
@@ -4086,7 +4300,7 @@
           <a:p>
             <a:fld id="{52A40D1F-8DC8-452B-B505-1D78AF183F5D}" type="datetimeFigureOut">
               <a:rPr lang="en-CA" smtClean="0"/>
-              <a:t>7/22/2021</a:t>
+              <a:t>7/23/2021</a:t>
             </a:fld>
             <a:endParaRPr lang="en-CA"/>
           </a:p>
@@ -4383,7 +4597,7 @@
           <a:p>
             <a:fld id="{52A40D1F-8DC8-452B-B505-1D78AF183F5D}" type="datetimeFigureOut">
               <a:rPr lang="en-CA" smtClean="0"/>
-              <a:t>7/22/2021</a:t>
+              <a:t>7/23/2021</a:t>
             </a:fld>
             <a:endParaRPr lang="en-CA"/>
           </a:p>
@@ -4825,7 +5039,7 @@
           <a:p>
             <a:fld id="{52A40D1F-8DC8-452B-B505-1D78AF183F5D}" type="datetimeFigureOut">
               <a:rPr lang="en-CA" smtClean="0"/>
-              <a:t>7/22/2021</a:t>
+              <a:t>7/23/2021</a:t>
             </a:fld>
             <a:endParaRPr lang="en-CA"/>
           </a:p>
@@ -4943,7 +5157,7 @@
           <a:p>
             <a:fld id="{52A40D1F-8DC8-452B-B505-1D78AF183F5D}" type="datetimeFigureOut">
               <a:rPr lang="en-CA" smtClean="0"/>
-              <a:t>7/22/2021</a:t>
+              <a:t>7/23/2021</a:t>
             </a:fld>
             <a:endParaRPr lang="en-CA"/>
           </a:p>
@@ -5038,7 +5252,7 @@
           <a:p>
             <a:fld id="{52A40D1F-8DC8-452B-B505-1D78AF183F5D}" type="datetimeFigureOut">
               <a:rPr lang="en-CA" smtClean="0"/>
-              <a:t>7/22/2021</a:t>
+              <a:t>7/23/2021</a:t>
             </a:fld>
             <a:endParaRPr lang="en-CA"/>
           </a:p>
@@ -5321,7 +5535,7 @@
           <a:p>
             <a:fld id="{52A40D1F-8DC8-452B-B505-1D78AF183F5D}" type="datetimeFigureOut">
               <a:rPr lang="en-CA" smtClean="0"/>
-              <a:t>7/22/2021</a:t>
+              <a:t>7/23/2021</a:t>
             </a:fld>
             <a:endParaRPr lang="en-CA"/>
           </a:p>
@@ -5612,7 +5826,7 @@
           <a:p>
             <a:fld id="{52A40D1F-8DC8-452B-B505-1D78AF183F5D}" type="datetimeFigureOut">
               <a:rPr lang="en-CA" smtClean="0"/>
-              <a:t>7/22/2021</a:t>
+              <a:t>7/23/2021</a:t>
             </a:fld>
             <a:endParaRPr lang="en-CA"/>
           </a:p>
@@ -6142,7 +6356,7 @@
           <a:p>
             <a:fld id="{52A40D1F-8DC8-452B-B505-1D78AF183F5D}" type="datetimeFigureOut">
               <a:rPr lang="en-CA" smtClean="0"/>
-              <a:t>7/22/2021</a:t>
+              <a:t>7/23/2021</a:t>
             </a:fld>
             <a:endParaRPr lang="en-CA"/>
           </a:p>
@@ -6694,7 +6908,14 @@
             </a:r>
             <a:r>
               <a:rPr lang="en-CA" dirty="0"/>
-              <a:t> I</a:t>
+              <a:t> I:</a:t>
+            </a:r>
+            <a:br>
+              <a:rPr lang="en-CA" dirty="0"/>
+            </a:br>
+            <a:r>
+              <a:rPr lang="en-CA" dirty="0"/>
+              <a:t>API Queries</a:t>
             </a:r>
           </a:p>
         </p:txBody>
@@ -8349,7 +8570,7 @@
           <p:nvPr/>
         </p:nvPicPr>
         <p:blipFill>
-          <a:blip r:embed="rId2"/>
+          <a:blip r:embed="rId3"/>
           <a:stretch>
             <a:fillRect/>
           </a:stretch>
@@ -8373,7 +8594,7 @@
           <p:nvPr/>
         </p:nvPicPr>
         <p:blipFill>
-          <a:blip r:embed="rId3">
+          <a:blip r:embed="rId4">
             <a:extLst>
               <a:ext uri="{28A0092B-C50C-407E-A947-70E740481C1C}">
                 <a14:useLocalDpi xmlns:a14="http://schemas.microsoft.com/office/drawing/2010/main" val="0"/>
@@ -8530,7 +8751,7 @@
           <p:nvPr/>
         </p:nvPicPr>
         <p:blipFill>
-          <a:blip r:embed="rId2">
+          <a:blip r:embed="rId3">
             <a:extLst>
               <a:ext uri="{28A0092B-C50C-407E-A947-70E740481C1C}">
                 <a14:useLocalDpi xmlns:a14="http://schemas.microsoft.com/office/drawing/2010/main" val="0"/>

</xml_diff>